<commit_message>
debug when load fat-fs-img
</commit_message>
<xml_diff>
--- a/repo/0507.pptx
+++ b/repo/0507.pptx
@@ -7,9 +7,18 @@
   <p:sldIdLst>
     <p:sldId id="256" r:id="rId2"/>
     <p:sldId id="257" r:id="rId3"/>
-    <p:sldId id="258" r:id="rId4"/>
-    <p:sldId id="259" r:id="rId5"/>
-    <p:sldId id="260" r:id="rId6"/>
+    <p:sldId id="261" r:id="rId4"/>
+    <p:sldId id="258" r:id="rId5"/>
+    <p:sldId id="264" r:id="rId6"/>
+    <p:sldId id="263" r:id="rId7"/>
+    <p:sldId id="262" r:id="rId8"/>
+    <p:sldId id="265" r:id="rId9"/>
+    <p:sldId id="266" r:id="rId10"/>
+    <p:sldId id="269" r:id="rId11"/>
+    <p:sldId id="259" r:id="rId12"/>
+    <p:sldId id="268" r:id="rId13"/>
+    <p:sldId id="267" r:id="rId14"/>
+    <p:sldId id="260" r:id="rId15"/>
   </p:sldIdLst>
   <p:sldSz cx="12192000" cy="6858000"/>
   <p:notesSz cx="6858000" cy="9144000"/>
@@ -108,6 +117,11 @@
       </a:defRPr>
     </a:lvl9pPr>
   </p:defaultTextStyle>
+  <p:extLst>
+    <p:ext uri="{EFAFB233-063F-42B5-8137-9DF3F51BA10A}">
+      <p15:sldGuideLst xmlns:p15="http://schemas.microsoft.com/office/powerpoint/2012/main"/>
+    </p:ext>
+  </p:extLst>
 </p:presentation>
 </file>
 
@@ -258,7 +272,7 @@
           <a:p>
             <a:fld id="{B148C46F-B0FD-45AB-9BAB-1BDFCAB0CF96}" type="datetimeFigureOut">
               <a:rPr lang="zh-CN" altLang="en-US" smtClean="0"/>
-              <a:t>2022/5/7</a:t>
+              <a:t>2022/5/14</a:t>
             </a:fld>
             <a:endParaRPr lang="zh-CN" altLang="en-US"/>
           </a:p>
@@ -456,7 +470,7 @@
           <a:p>
             <a:fld id="{B148C46F-B0FD-45AB-9BAB-1BDFCAB0CF96}" type="datetimeFigureOut">
               <a:rPr lang="zh-CN" altLang="en-US" smtClean="0"/>
-              <a:t>2022/5/7</a:t>
+              <a:t>2022/5/14</a:t>
             </a:fld>
             <a:endParaRPr lang="zh-CN" altLang="en-US"/>
           </a:p>
@@ -664,7 +678,7 @@
           <a:p>
             <a:fld id="{B148C46F-B0FD-45AB-9BAB-1BDFCAB0CF96}" type="datetimeFigureOut">
               <a:rPr lang="zh-CN" altLang="en-US" smtClean="0"/>
-              <a:t>2022/5/7</a:t>
+              <a:t>2022/5/14</a:t>
             </a:fld>
             <a:endParaRPr lang="zh-CN" altLang="en-US"/>
           </a:p>
@@ -862,7 +876,7 @@
           <a:p>
             <a:fld id="{B148C46F-B0FD-45AB-9BAB-1BDFCAB0CF96}" type="datetimeFigureOut">
               <a:rPr lang="zh-CN" altLang="en-US" smtClean="0"/>
-              <a:t>2022/5/7</a:t>
+              <a:t>2022/5/14</a:t>
             </a:fld>
             <a:endParaRPr lang="zh-CN" altLang="en-US"/>
           </a:p>
@@ -1137,7 +1151,7 @@
           <a:p>
             <a:fld id="{B148C46F-B0FD-45AB-9BAB-1BDFCAB0CF96}" type="datetimeFigureOut">
               <a:rPr lang="zh-CN" altLang="en-US" smtClean="0"/>
-              <a:t>2022/5/7</a:t>
+              <a:t>2022/5/14</a:t>
             </a:fld>
             <a:endParaRPr lang="zh-CN" altLang="en-US"/>
           </a:p>
@@ -1402,7 +1416,7 @@
           <a:p>
             <a:fld id="{B148C46F-B0FD-45AB-9BAB-1BDFCAB0CF96}" type="datetimeFigureOut">
               <a:rPr lang="zh-CN" altLang="en-US" smtClean="0"/>
-              <a:t>2022/5/7</a:t>
+              <a:t>2022/5/14</a:t>
             </a:fld>
             <a:endParaRPr lang="zh-CN" altLang="en-US"/>
           </a:p>
@@ -1814,7 +1828,7 @@
           <a:p>
             <a:fld id="{B148C46F-B0FD-45AB-9BAB-1BDFCAB0CF96}" type="datetimeFigureOut">
               <a:rPr lang="zh-CN" altLang="en-US" smtClean="0"/>
-              <a:t>2022/5/7</a:t>
+              <a:t>2022/5/14</a:t>
             </a:fld>
             <a:endParaRPr lang="zh-CN" altLang="en-US"/>
           </a:p>
@@ -1955,7 +1969,7 @@
           <a:p>
             <a:fld id="{B148C46F-B0FD-45AB-9BAB-1BDFCAB0CF96}" type="datetimeFigureOut">
               <a:rPr lang="zh-CN" altLang="en-US" smtClean="0"/>
-              <a:t>2022/5/7</a:t>
+              <a:t>2022/5/14</a:t>
             </a:fld>
             <a:endParaRPr lang="zh-CN" altLang="en-US"/>
           </a:p>
@@ -2068,7 +2082,7 @@
           <a:p>
             <a:fld id="{B148C46F-B0FD-45AB-9BAB-1BDFCAB0CF96}" type="datetimeFigureOut">
               <a:rPr lang="zh-CN" altLang="en-US" smtClean="0"/>
-              <a:t>2022/5/7</a:t>
+              <a:t>2022/5/14</a:t>
             </a:fld>
             <a:endParaRPr lang="zh-CN" altLang="en-US"/>
           </a:p>
@@ -2379,7 +2393,7 @@
           <a:p>
             <a:fld id="{B148C46F-B0FD-45AB-9BAB-1BDFCAB0CF96}" type="datetimeFigureOut">
               <a:rPr lang="zh-CN" altLang="en-US" smtClean="0"/>
-              <a:t>2022/5/7</a:t>
+              <a:t>2022/5/14</a:t>
             </a:fld>
             <a:endParaRPr lang="zh-CN" altLang="en-US"/>
           </a:p>
@@ -2667,7 +2681,7 @@
           <a:p>
             <a:fld id="{B148C46F-B0FD-45AB-9BAB-1BDFCAB0CF96}" type="datetimeFigureOut">
               <a:rPr lang="zh-CN" altLang="en-US" smtClean="0"/>
-              <a:t>2022/5/7</a:t>
+              <a:t>2022/5/14</a:t>
             </a:fld>
             <a:endParaRPr lang="zh-CN" altLang="en-US"/>
           </a:p>
@@ -2908,7 +2922,7 @@
           <a:p>
             <a:fld id="{B148C46F-B0FD-45AB-9BAB-1BDFCAB0CF96}" type="datetimeFigureOut">
               <a:rPr lang="zh-CN" altLang="en-US" smtClean="0"/>
-              <a:t>2022/5/7</a:t>
+              <a:t>2022/5/14</a:t>
             </a:fld>
             <a:endParaRPr lang="zh-CN" altLang="en-US"/>
           </a:p>
@@ -3383,15 +3397,8 @@
           <a:lstStyle/>
           <a:p>
             <a:r>
-              <a:rPr lang="zh-CN" altLang="en-US" dirty="0"/>
-              <a:t>闭浩扬 张熙至</a:t>
-            </a:r>
-            <a:endParaRPr lang="en-US" altLang="zh-CN" dirty="0"/>
-          </a:p>
-          <a:p>
-            <a:r>
-              <a:rPr lang="en-US" altLang="zh-CN" dirty="0"/>
-              <a:t>2022/5/7</a:t>
+              <a:rPr lang="en-US" altLang="zh-CN" dirty="0"/>
+              <a:t>2022/4/30 - 2022/5/14</a:t>
             </a:r>
             <a:endParaRPr lang="zh-CN" altLang="en-US" dirty="0"/>
           </a:p>
@@ -3401,6 +3408,817 @@
     <p:extLst>
       <p:ext uri="{BB962C8B-B14F-4D97-AF65-F5344CB8AC3E}">
         <p14:creationId xmlns:p14="http://schemas.microsoft.com/office/powerpoint/2010/main" val="3679500631"/>
+      </p:ext>
+    </p:extLst>
+  </p:cSld>
+  <p:clrMapOvr>
+    <a:masterClrMapping/>
+  </p:clrMapOvr>
+</p:sld>
+</file>
+
+<file path=ppt/slides/slide10.xml><?xml version="1.0" encoding="utf-8"?>
+<p:sld xmlns:a="http://schemas.openxmlformats.org/drawingml/2006/main" xmlns:r="http://schemas.openxmlformats.org/officeDocument/2006/relationships" xmlns:p="http://schemas.openxmlformats.org/presentationml/2006/main">
+  <p:cSld>
+    <p:spTree>
+      <p:nvGrpSpPr>
+        <p:cNvPr id="1" name=""/>
+        <p:cNvGrpSpPr/>
+        <p:nvPr/>
+      </p:nvGrpSpPr>
+      <p:grpSpPr>
+        <a:xfrm>
+          <a:off x="0" y="0"/>
+          <a:ext cx="0" cy="0"/>
+          <a:chOff x="0" y="0"/>
+          <a:chExt cx="0" cy="0"/>
+        </a:xfrm>
+      </p:grpSpPr>
+      <p:sp>
+        <p:nvSpPr>
+          <p:cNvPr id="2" name="标题 1">
+            <a:extLst>
+              <a:ext uri="{FF2B5EF4-FFF2-40B4-BE49-F238E27FC236}">
+                <a16:creationId xmlns:a16="http://schemas.microsoft.com/office/drawing/2014/main" id="{921CDABC-22DE-44A5-A30F-DBC4B4920F37}"/>
+              </a:ext>
+            </a:extLst>
+          </p:cNvPr>
+          <p:cNvSpPr>
+            <a:spLocks noGrp="1"/>
+          </p:cNvSpPr>
+          <p:nvPr>
+            <p:ph type="title"/>
+          </p:nvPr>
+        </p:nvSpPr>
+        <p:spPr/>
+        <p:txBody>
+          <a:bodyPr/>
+          <a:lstStyle/>
+          <a:p>
+            <a:r>
+              <a:rPr lang="en-US" altLang="zh-CN" dirty="0"/>
+              <a:t>Trap </a:t>
+            </a:r>
+            <a:r>
+              <a:rPr lang="zh-CN" altLang="en-US" dirty="0"/>
+              <a:t>说明</a:t>
+            </a:r>
+          </a:p>
+        </p:txBody>
+      </p:sp>
+      <p:sp>
+        <p:nvSpPr>
+          <p:cNvPr id="3" name="内容占位符 2">
+            <a:extLst>
+              <a:ext uri="{FF2B5EF4-FFF2-40B4-BE49-F238E27FC236}">
+                <a16:creationId xmlns:a16="http://schemas.microsoft.com/office/drawing/2014/main" id="{E5D1A4DC-92DB-458D-B3C7-7FB27010AA39}"/>
+              </a:ext>
+            </a:extLst>
+          </p:cNvPr>
+          <p:cNvSpPr>
+            <a:spLocks noGrp="1"/>
+          </p:cNvSpPr>
+          <p:nvPr>
+            <p:ph idx="1"/>
+          </p:nvPr>
+        </p:nvSpPr>
+        <p:spPr/>
+        <p:txBody>
+          <a:bodyPr/>
+          <a:lstStyle/>
+          <a:p>
+            <a:r>
+              <a:rPr lang="zh-CN" altLang="en-US" dirty="0"/>
+              <a:t>中断发生时，所有寄存器暂时都是不能动的，在 </a:t>
+            </a:r>
+            <a:r>
+              <a:rPr lang="en-US" altLang="zh-CN" dirty="0" err="1"/>
+              <a:t>rCore</a:t>
+            </a:r>
+            <a:r>
+              <a:rPr lang="en-US" altLang="zh-CN" dirty="0"/>
+              <a:t> </a:t>
+            </a:r>
+            <a:r>
+              <a:rPr lang="zh-CN" altLang="en-US" dirty="0"/>
+              <a:t>原始实现中，用 </a:t>
+            </a:r>
+            <a:r>
+              <a:rPr lang="en-US" altLang="zh-CN" dirty="0" err="1"/>
+              <a:t>sscratch</a:t>
+            </a:r>
+            <a:r>
+              <a:rPr lang="en-US" altLang="zh-CN" dirty="0"/>
+              <a:t> </a:t>
+            </a:r>
+            <a:r>
+              <a:rPr lang="zh-CN" altLang="en-US" dirty="0"/>
+              <a:t>提供了一个</a:t>
+            </a:r>
+            <a:r>
+              <a:rPr lang="en-US" altLang="zh-CN" dirty="0"/>
+              <a:t>”</a:t>
+            </a:r>
+            <a:r>
+              <a:rPr lang="zh-CN" altLang="en-US" dirty="0"/>
+              <a:t>安全</a:t>
+            </a:r>
+            <a:r>
+              <a:rPr lang="en-US" altLang="zh-CN" dirty="0"/>
+              <a:t>”</a:t>
+            </a:r>
+            <a:r>
+              <a:rPr lang="zh-CN" altLang="en-US" dirty="0"/>
+              <a:t>的栈，存好寄存器信息以后就可以继续了</a:t>
+            </a:r>
+            <a:endParaRPr lang="en-US" altLang="zh-CN" dirty="0"/>
+          </a:p>
+          <a:p>
+            <a:r>
+              <a:rPr lang="zh-CN" altLang="en-US" dirty="0"/>
+              <a:t>但是内核开中断时，</a:t>
+            </a:r>
+            <a:r>
+              <a:rPr lang="en-US" altLang="zh-CN" dirty="0" err="1"/>
+              <a:t>sscratch</a:t>
+            </a:r>
+            <a:r>
+              <a:rPr lang="en-US" altLang="zh-CN" dirty="0"/>
+              <a:t> </a:t>
+            </a:r>
+            <a:r>
+              <a:rPr lang="zh-CN" altLang="en-US" dirty="0"/>
+              <a:t>也不一定可靠：</a:t>
+            </a:r>
+            <a:endParaRPr lang="en-US" altLang="zh-CN" dirty="0"/>
+          </a:p>
+          <a:p>
+            <a:pPr lvl="1"/>
+            <a:r>
+              <a:rPr lang="zh-CN" altLang="en-US" dirty="0"/>
+              <a:t>利用分支提供额外的信息</a:t>
+            </a:r>
+            <a:endParaRPr lang="en-US" altLang="zh-CN" dirty="0"/>
+          </a:p>
+          <a:p>
+            <a:pPr lvl="1"/>
+            <a:r>
+              <a:rPr lang="zh-CN" altLang="en-US" dirty="0"/>
+              <a:t>利用 </a:t>
+            </a:r>
+            <a:r>
+              <a:rPr lang="en-US" altLang="zh-CN" dirty="0" err="1"/>
+              <a:t>bgtz</a:t>
+            </a:r>
+            <a:r>
+              <a:rPr lang="en-US" altLang="zh-CN" dirty="0"/>
+              <a:t> </a:t>
+            </a:r>
+            <a:r>
+              <a:rPr lang="en-US" altLang="zh-CN" dirty="0" err="1"/>
+              <a:t>sp</a:t>
+            </a:r>
+            <a:r>
+              <a:rPr lang="en-US" altLang="zh-CN" dirty="0"/>
+              <a:t> / bez </a:t>
+            </a:r>
+            <a:r>
+              <a:rPr lang="en-US" altLang="zh-CN" dirty="0" err="1"/>
+              <a:t>sp</a:t>
+            </a:r>
+            <a:r>
+              <a:rPr lang="en-US" altLang="zh-CN" dirty="0"/>
+              <a:t> </a:t>
+            </a:r>
+            <a:r>
+              <a:rPr lang="zh-CN" altLang="en-US" dirty="0"/>
+              <a:t>区分用户地址</a:t>
+            </a:r>
+            <a:r>
+              <a:rPr lang="en-US" altLang="zh-CN" dirty="0"/>
+              <a:t>(</a:t>
+            </a:r>
+            <a:r>
+              <a:rPr lang="zh-CN" altLang="en-US" dirty="0"/>
+              <a:t>低地址</a:t>
+            </a:r>
+            <a:r>
+              <a:rPr lang="en-US" altLang="zh-CN" dirty="0"/>
+              <a:t>)</a:t>
+            </a:r>
+            <a:r>
+              <a:rPr lang="zh-CN" altLang="en-US" dirty="0"/>
+              <a:t>，内核地址</a:t>
+            </a:r>
+            <a:r>
+              <a:rPr lang="en-US" altLang="zh-CN" dirty="0"/>
+              <a:t>(</a:t>
+            </a:r>
+            <a:r>
+              <a:rPr lang="zh-CN" altLang="en-US" dirty="0"/>
+              <a:t>高地址</a:t>
+            </a:r>
+            <a:r>
+              <a:rPr lang="en-US" altLang="zh-CN" dirty="0"/>
+              <a:t>)</a:t>
+            </a:r>
+            <a:r>
+              <a:rPr lang="zh-CN" altLang="en-US" dirty="0"/>
+              <a:t>，</a:t>
+            </a:r>
+            <a:r>
+              <a:rPr lang="en-US" altLang="zh-CN" dirty="0"/>
+              <a:t>0(</a:t>
+            </a:r>
+            <a:r>
+              <a:rPr lang="zh-CN" altLang="en-US" dirty="0"/>
+              <a:t>空闲状态的内核</a:t>
+            </a:r>
+            <a:r>
+              <a:rPr lang="en-US" altLang="zh-CN" dirty="0"/>
+              <a:t>)</a:t>
+            </a:r>
+          </a:p>
+          <a:p>
+            <a:r>
+              <a:rPr lang="zh-CN" altLang="en-US" dirty="0"/>
+              <a:t>如果是内核中断，那么不换栈，直接原地压栈进中断处理</a:t>
+            </a:r>
+            <a:endParaRPr lang="en-US" altLang="zh-CN" dirty="0"/>
+          </a:p>
+          <a:p>
+            <a:pPr marL="0" indent="0">
+              <a:buNone/>
+            </a:pPr>
+            <a:endParaRPr lang="en-US" altLang="zh-CN" dirty="0"/>
+          </a:p>
+        </p:txBody>
+      </p:sp>
+    </p:spTree>
+    <p:extLst>
+      <p:ext uri="{BB962C8B-B14F-4D97-AF65-F5344CB8AC3E}">
+        <p14:creationId xmlns:p14="http://schemas.microsoft.com/office/powerpoint/2010/main" val="1750358269"/>
+      </p:ext>
+    </p:extLst>
+  </p:cSld>
+  <p:clrMapOvr>
+    <a:masterClrMapping/>
+  </p:clrMapOvr>
+</p:sld>
+</file>
+
+<file path=ppt/slides/slide11.xml><?xml version="1.0" encoding="utf-8"?>
+<p:sld xmlns:a="http://schemas.openxmlformats.org/drawingml/2006/main" xmlns:r="http://schemas.openxmlformats.org/officeDocument/2006/relationships" xmlns:p="http://schemas.openxmlformats.org/presentationml/2006/main">
+  <p:cSld>
+    <p:spTree>
+      <p:nvGrpSpPr>
+        <p:cNvPr id="1" name=""/>
+        <p:cNvGrpSpPr/>
+        <p:nvPr/>
+      </p:nvGrpSpPr>
+      <p:grpSpPr>
+        <a:xfrm>
+          <a:off x="0" y="0"/>
+          <a:ext cx="0" cy="0"/>
+          <a:chOff x="0" y="0"/>
+          <a:chExt cx="0" cy="0"/>
+        </a:xfrm>
+      </p:grpSpPr>
+      <p:sp>
+        <p:nvSpPr>
+          <p:cNvPr id="2" name="标题 1">
+            <a:extLst>
+              <a:ext uri="{FF2B5EF4-FFF2-40B4-BE49-F238E27FC236}">
+                <a16:creationId xmlns:a16="http://schemas.microsoft.com/office/drawing/2014/main" id="{A108C52C-1C93-4517-89D6-BA29BB041AE9}"/>
+              </a:ext>
+            </a:extLst>
+          </p:cNvPr>
+          <p:cNvSpPr>
+            <a:spLocks noGrp="1"/>
+          </p:cNvSpPr>
+          <p:nvPr>
+            <p:ph type="title"/>
+          </p:nvPr>
+        </p:nvSpPr>
+        <p:spPr/>
+        <p:txBody>
+          <a:bodyPr/>
+          <a:lstStyle/>
+          <a:p>
+            <a:r>
+              <a:rPr lang="en-US" altLang="zh-CN" dirty="0"/>
+              <a:t>ch5/ch6/ch7 </a:t>
+            </a:r>
+            <a:r>
+              <a:rPr lang="zh-CN" altLang="en-US" dirty="0"/>
+              <a:t>的说明</a:t>
+            </a:r>
+          </a:p>
+        </p:txBody>
+      </p:sp>
+      <p:sp>
+        <p:nvSpPr>
+          <p:cNvPr id="3" name="内容占位符 2">
+            <a:extLst>
+              <a:ext uri="{FF2B5EF4-FFF2-40B4-BE49-F238E27FC236}">
+                <a16:creationId xmlns:a16="http://schemas.microsoft.com/office/drawing/2014/main" id="{229F13D7-247C-41BB-B7EB-CA2461B0BE2C}"/>
+              </a:ext>
+            </a:extLst>
+          </p:cNvPr>
+          <p:cNvSpPr>
+            <a:spLocks noGrp="1"/>
+          </p:cNvSpPr>
+          <p:nvPr>
+            <p:ph idx="1"/>
+          </p:nvPr>
+        </p:nvSpPr>
+        <p:spPr/>
+        <p:txBody>
+          <a:bodyPr/>
+          <a:lstStyle/>
+          <a:p>
+            <a:r>
+              <a:rPr lang="zh-CN" altLang="en-US" dirty="0"/>
+              <a:t>参考了很多 </a:t>
+            </a:r>
+            <a:r>
+              <a:rPr lang="en-US" altLang="zh-CN" dirty="0" err="1"/>
+              <a:t>rCore</a:t>
+            </a:r>
+            <a:r>
+              <a:rPr lang="en-US" altLang="zh-CN" dirty="0"/>
+              <a:t> </a:t>
+            </a:r>
+            <a:r>
+              <a:rPr lang="zh-CN" altLang="en-US" dirty="0"/>
+              <a:t>的内容，可能一眼看上去跟 </a:t>
+            </a:r>
+            <a:r>
+              <a:rPr lang="en-US" altLang="zh-CN" dirty="0" err="1"/>
+              <a:t>rCore</a:t>
+            </a:r>
+            <a:r>
+              <a:rPr lang="en-US" altLang="zh-CN" dirty="0"/>
+              <a:t> </a:t>
+            </a:r>
+            <a:r>
+              <a:rPr lang="zh-CN" altLang="en-US" dirty="0"/>
+              <a:t>有八成像，但很多结构上的设计是不同的。</a:t>
+            </a:r>
+            <a:endParaRPr lang="en-US" altLang="zh-CN" dirty="0"/>
+          </a:p>
+          <a:p>
+            <a:r>
+              <a:rPr lang="zh-CN" altLang="en-US" dirty="0"/>
+              <a:t>我们终究不是要做一个</a:t>
+            </a:r>
+            <a:r>
+              <a:rPr lang="en-US" altLang="zh-CN" dirty="0"/>
+              <a:t>”</a:t>
+            </a:r>
+            <a:r>
+              <a:rPr lang="zh-CN" altLang="en-US" dirty="0"/>
+              <a:t>多核</a:t>
+            </a:r>
+            <a:r>
+              <a:rPr lang="en-US" altLang="zh-CN" dirty="0" err="1"/>
+              <a:t>rCore</a:t>
+            </a:r>
+            <a:r>
+              <a:rPr lang="en-US" altLang="zh-CN" dirty="0"/>
+              <a:t>”</a:t>
+            </a:r>
+            <a:r>
+              <a:rPr lang="zh-CN" altLang="en-US" dirty="0"/>
+              <a:t>，而是要写一个新内核。不过目前和别人做的不一样的地方都比较细节，很难概况哪些是创新点。目前基本都体现在代码注释里</a:t>
+            </a:r>
+            <a:endParaRPr lang="en-US" altLang="zh-CN" dirty="0"/>
+          </a:p>
+          <a:p>
+            <a:endParaRPr lang="en-US" altLang="zh-CN" dirty="0"/>
+          </a:p>
+          <a:p>
+            <a:r>
+              <a:rPr lang="zh-CN" altLang="en-US" dirty="0"/>
+              <a:t>顺便一提，目前项目的设计文档因为调度器的重构已经过时了，需要尽快更新</a:t>
+            </a:r>
+          </a:p>
+        </p:txBody>
+      </p:sp>
+    </p:spTree>
+    <p:extLst>
+      <p:ext uri="{BB962C8B-B14F-4D97-AF65-F5344CB8AC3E}">
+        <p14:creationId xmlns:p14="http://schemas.microsoft.com/office/powerpoint/2010/main" val="2753600860"/>
+      </p:ext>
+    </p:extLst>
+  </p:cSld>
+  <p:clrMapOvr>
+    <a:masterClrMapping/>
+  </p:clrMapOvr>
+</p:sld>
+</file>
+
+<file path=ppt/slides/slide12.xml><?xml version="1.0" encoding="utf-8"?>
+<p:sld xmlns:a="http://schemas.openxmlformats.org/drawingml/2006/main" xmlns:r="http://schemas.openxmlformats.org/officeDocument/2006/relationships" xmlns:p="http://schemas.openxmlformats.org/presentationml/2006/main">
+  <p:cSld>
+    <p:spTree>
+      <p:nvGrpSpPr>
+        <p:cNvPr id="1" name=""/>
+        <p:cNvGrpSpPr/>
+        <p:nvPr/>
+      </p:nvGrpSpPr>
+      <p:grpSpPr>
+        <a:xfrm>
+          <a:off x="0" y="0"/>
+          <a:ext cx="0" cy="0"/>
+          <a:chOff x="0" y="0"/>
+          <a:chExt cx="0" cy="0"/>
+        </a:xfrm>
+      </p:grpSpPr>
+      <p:sp>
+        <p:nvSpPr>
+          <p:cNvPr id="2" name="标题 1">
+            <a:extLst>
+              <a:ext uri="{FF2B5EF4-FFF2-40B4-BE49-F238E27FC236}">
+                <a16:creationId xmlns:a16="http://schemas.microsoft.com/office/drawing/2014/main" id="{32981164-049D-4DE4-8A06-D3CCBC53AD9A}"/>
+              </a:ext>
+            </a:extLst>
+          </p:cNvPr>
+          <p:cNvSpPr>
+            <a:spLocks noGrp="1"/>
+          </p:cNvSpPr>
+          <p:nvPr>
+            <p:ph type="title"/>
+          </p:nvPr>
+        </p:nvSpPr>
+        <p:spPr/>
+        <p:txBody>
+          <a:bodyPr/>
+          <a:lstStyle/>
+          <a:p>
+            <a:r>
+              <a:rPr lang="zh-CN" altLang="en-US" dirty="0"/>
+              <a:t>调度器说明</a:t>
+            </a:r>
+          </a:p>
+        </p:txBody>
+      </p:sp>
+      <p:sp>
+        <p:nvSpPr>
+          <p:cNvPr id="3" name="内容占位符 2">
+            <a:extLst>
+              <a:ext uri="{FF2B5EF4-FFF2-40B4-BE49-F238E27FC236}">
+                <a16:creationId xmlns:a16="http://schemas.microsoft.com/office/drawing/2014/main" id="{C8FB541E-2E93-4DF5-8333-3E9CF25EFF33}"/>
+              </a:ext>
+            </a:extLst>
+          </p:cNvPr>
+          <p:cNvSpPr>
+            <a:spLocks noGrp="1"/>
+          </p:cNvSpPr>
+          <p:nvPr>
+            <p:ph idx="1"/>
+          </p:nvPr>
+        </p:nvSpPr>
+        <p:spPr/>
+        <p:txBody>
+          <a:bodyPr/>
+          <a:lstStyle/>
+          <a:p>
+            <a:r>
+              <a:rPr lang="en-US" altLang="zh-CN" dirty="0" err="1"/>
+              <a:t>run_tasks</a:t>
+            </a:r>
+            <a:r>
+              <a:rPr lang="en-US" altLang="zh-CN" dirty="0"/>
+              <a:t>() </a:t>
+            </a:r>
+            <a:r>
+              <a:rPr lang="zh-CN" altLang="en-US" dirty="0"/>
+              <a:t>循环中，“把进程放回队列”的过程放在 </a:t>
+            </a:r>
+            <a:r>
+              <a:rPr lang="en-US" altLang="zh-CN" dirty="0"/>
+              <a:t>switch </a:t>
+            </a:r>
+            <a:r>
+              <a:rPr lang="zh-CN" altLang="en-US" dirty="0"/>
+              <a:t>之后</a:t>
+            </a:r>
+            <a:endParaRPr lang="en-US" altLang="zh-CN" dirty="0"/>
+          </a:p>
+          <a:p>
+            <a:r>
+              <a:rPr lang="zh-CN" altLang="en-US" dirty="0"/>
+              <a:t>处理僵尸进程时，注意处理拿锁的顺序，防止死锁</a:t>
+            </a:r>
+            <a:endParaRPr lang="en-US" altLang="zh-CN" dirty="0"/>
+          </a:p>
+          <a:p>
+            <a:endParaRPr lang="zh-CN" altLang="en-US" dirty="0"/>
+          </a:p>
+        </p:txBody>
+      </p:sp>
+    </p:spTree>
+    <p:extLst>
+      <p:ext uri="{BB962C8B-B14F-4D97-AF65-F5344CB8AC3E}">
+        <p14:creationId xmlns:p14="http://schemas.microsoft.com/office/powerpoint/2010/main" val="212165131"/>
+      </p:ext>
+    </p:extLst>
+  </p:cSld>
+  <p:clrMapOvr>
+    <a:masterClrMapping/>
+  </p:clrMapOvr>
+</p:sld>
+</file>
+
+<file path=ppt/slides/slide13.xml><?xml version="1.0" encoding="utf-8"?>
+<p:sld xmlns:a="http://schemas.openxmlformats.org/drawingml/2006/main" xmlns:r="http://schemas.openxmlformats.org/officeDocument/2006/relationships" xmlns:p="http://schemas.openxmlformats.org/presentationml/2006/main">
+  <p:cSld>
+    <p:spTree>
+      <p:nvGrpSpPr>
+        <p:cNvPr id="1" name=""/>
+        <p:cNvGrpSpPr/>
+        <p:nvPr/>
+      </p:nvGrpSpPr>
+      <p:grpSpPr>
+        <a:xfrm>
+          <a:off x="0" y="0"/>
+          <a:ext cx="0" cy="0"/>
+          <a:chOff x="0" y="0"/>
+          <a:chExt cx="0" cy="0"/>
+        </a:xfrm>
+      </p:grpSpPr>
+      <p:sp>
+        <p:nvSpPr>
+          <p:cNvPr id="2" name="标题 1">
+            <a:extLst>
+              <a:ext uri="{FF2B5EF4-FFF2-40B4-BE49-F238E27FC236}">
+                <a16:creationId xmlns:a16="http://schemas.microsoft.com/office/drawing/2014/main" id="{B3A12C48-A5B5-4153-AA80-9B9BBFFBBF8C}"/>
+              </a:ext>
+            </a:extLst>
+          </p:cNvPr>
+          <p:cNvSpPr>
+            <a:spLocks noGrp="1"/>
+          </p:cNvSpPr>
+          <p:nvPr>
+            <p:ph type="title"/>
+          </p:nvPr>
+        </p:nvSpPr>
+        <p:spPr/>
+        <p:txBody>
+          <a:bodyPr/>
+          <a:lstStyle/>
+          <a:p>
+            <a:r>
+              <a:rPr lang="zh-CN" altLang="en-US" dirty="0"/>
+              <a:t>关于文件系统</a:t>
+            </a:r>
+          </a:p>
+        </p:txBody>
+      </p:sp>
+      <p:sp>
+        <p:nvSpPr>
+          <p:cNvPr id="3" name="内容占位符 2">
+            <a:extLst>
+              <a:ext uri="{FF2B5EF4-FFF2-40B4-BE49-F238E27FC236}">
+                <a16:creationId xmlns:a16="http://schemas.microsoft.com/office/drawing/2014/main" id="{1F6CB9B8-4013-47F8-87AF-1C3D78C32A25}"/>
+              </a:ext>
+            </a:extLst>
+          </p:cNvPr>
+          <p:cNvSpPr>
+            <a:spLocks noGrp="1"/>
+          </p:cNvSpPr>
+          <p:nvPr>
+            <p:ph idx="1"/>
+          </p:nvPr>
+        </p:nvSpPr>
+        <p:spPr/>
+        <p:txBody>
+          <a:bodyPr/>
+          <a:lstStyle/>
+          <a:p>
+            <a:r>
+              <a:rPr lang="zh-CN" altLang="en-US" dirty="0"/>
+              <a:t>目前文件系统是 </a:t>
+            </a:r>
+            <a:r>
+              <a:rPr lang="en-US" altLang="zh-CN" dirty="0"/>
+              <a:t>kernel -&gt; easy-fs -&gt; </a:t>
+            </a:r>
+            <a:r>
+              <a:rPr lang="en-US" altLang="zh-CN" dirty="0" err="1"/>
+              <a:t>virtIOBlk</a:t>
+            </a:r>
+            <a:r>
+              <a:rPr lang="zh-CN" altLang="en-US" dirty="0"/>
+              <a:t>。考虑换掉</a:t>
+            </a:r>
+            <a:r>
+              <a:rPr lang="en-US" altLang="zh-CN" dirty="0"/>
+              <a:t> easy-fs </a:t>
+            </a:r>
+            <a:r>
+              <a:rPr lang="zh-CN" altLang="en-US" dirty="0"/>
+              <a:t>，但至少底层的块设备跟上面是没什么依赖关系的，改</a:t>
+            </a:r>
+            <a:r>
+              <a:rPr lang="en-US" altLang="zh-CN" dirty="0"/>
+              <a:t>fs</a:t>
+            </a:r>
+            <a:r>
+              <a:rPr lang="zh-CN" altLang="en-US" dirty="0"/>
+              <a:t>对上板影响不大</a:t>
+            </a:r>
+            <a:endParaRPr lang="en-US" altLang="zh-CN" dirty="0"/>
+          </a:p>
+          <a:p>
+            <a:r>
+              <a:rPr lang="zh-CN" altLang="en-US" dirty="0"/>
+              <a:t>这周换成依赖于一个 </a:t>
+            </a:r>
+            <a:r>
+              <a:rPr lang="en-US" altLang="zh-CN" dirty="0"/>
+              <a:t>FAT </a:t>
+            </a:r>
+            <a:r>
+              <a:rPr lang="zh-CN" altLang="en-US" dirty="0"/>
+              <a:t>的实现，方便加初赛要求的接口，但可能之后还是需要重写的，因为它只是“以</a:t>
+            </a:r>
+            <a:r>
+              <a:rPr lang="en-US" altLang="zh-CN" dirty="0"/>
+              <a:t>FAT</a:t>
+            </a:r>
+            <a:r>
+              <a:rPr lang="zh-CN" altLang="en-US" dirty="0"/>
+              <a:t>要求的形式操作一个文件”，没有机制来给 </a:t>
+            </a:r>
+            <a:r>
+              <a:rPr lang="en-US" altLang="zh-CN" dirty="0" err="1"/>
+              <a:t>cpu</a:t>
+            </a:r>
+            <a:r>
+              <a:rPr lang="en-US" altLang="zh-CN" dirty="0"/>
+              <a:t> </a:t>
+            </a:r>
+            <a:r>
+              <a:rPr lang="zh-CN" altLang="en-US" dirty="0"/>
+              <a:t>发中断</a:t>
+            </a:r>
+            <a:endParaRPr lang="en-US" altLang="zh-CN" dirty="0"/>
+          </a:p>
+          <a:p>
+            <a:endParaRPr lang="zh-CN" altLang="en-US" dirty="0"/>
+          </a:p>
+        </p:txBody>
+      </p:sp>
+    </p:spTree>
+    <p:extLst>
+      <p:ext uri="{BB962C8B-B14F-4D97-AF65-F5344CB8AC3E}">
+        <p14:creationId xmlns:p14="http://schemas.microsoft.com/office/powerpoint/2010/main" val="603543199"/>
+      </p:ext>
+    </p:extLst>
+  </p:cSld>
+  <p:clrMapOvr>
+    <a:masterClrMapping/>
+  </p:clrMapOvr>
+</p:sld>
+</file>
+
+<file path=ppt/slides/slide14.xml><?xml version="1.0" encoding="utf-8"?>
+<p:sld xmlns:a="http://schemas.openxmlformats.org/drawingml/2006/main" xmlns:r="http://schemas.openxmlformats.org/officeDocument/2006/relationships" xmlns:p="http://schemas.openxmlformats.org/presentationml/2006/main">
+  <p:cSld>
+    <p:spTree>
+      <p:nvGrpSpPr>
+        <p:cNvPr id="1" name=""/>
+        <p:cNvGrpSpPr/>
+        <p:nvPr/>
+      </p:nvGrpSpPr>
+      <p:grpSpPr>
+        <a:xfrm>
+          <a:off x="0" y="0"/>
+          <a:ext cx="0" cy="0"/>
+          <a:chOff x="0" y="0"/>
+          <a:chExt cx="0" cy="0"/>
+        </a:xfrm>
+      </p:grpSpPr>
+      <p:sp>
+        <p:nvSpPr>
+          <p:cNvPr id="2" name="标题 1">
+            <a:extLst>
+              <a:ext uri="{FF2B5EF4-FFF2-40B4-BE49-F238E27FC236}">
+                <a16:creationId xmlns:a16="http://schemas.microsoft.com/office/drawing/2014/main" id="{4EBECA97-D42D-49DE-86BE-B25A9C006C6F}"/>
+              </a:ext>
+            </a:extLst>
+          </p:cNvPr>
+          <p:cNvSpPr>
+            <a:spLocks noGrp="1"/>
+          </p:cNvSpPr>
+          <p:nvPr>
+            <p:ph type="title"/>
+          </p:nvPr>
+        </p:nvSpPr>
+        <p:spPr/>
+        <p:txBody>
+          <a:bodyPr/>
+          <a:lstStyle/>
+          <a:p>
+            <a:r>
+              <a:rPr lang="en-US" altLang="zh-CN" dirty="0" err="1"/>
+              <a:t>Todo</a:t>
+            </a:r>
+            <a:endParaRPr lang="zh-CN" altLang="en-US" dirty="0"/>
+          </a:p>
+        </p:txBody>
+      </p:sp>
+      <p:sp>
+        <p:nvSpPr>
+          <p:cNvPr id="3" name="内容占位符 2">
+            <a:extLst>
+              <a:ext uri="{FF2B5EF4-FFF2-40B4-BE49-F238E27FC236}">
+                <a16:creationId xmlns:a16="http://schemas.microsoft.com/office/drawing/2014/main" id="{6285D6C3-5B79-4857-9520-391E1CD66A63}"/>
+              </a:ext>
+            </a:extLst>
+          </p:cNvPr>
+          <p:cNvSpPr>
+            <a:spLocks noGrp="1"/>
+          </p:cNvSpPr>
+          <p:nvPr>
+            <p:ph idx="1"/>
+          </p:nvPr>
+        </p:nvSpPr>
+        <p:spPr/>
+        <p:txBody>
+          <a:bodyPr/>
+          <a:lstStyle/>
+          <a:p>
+            <a:r>
+              <a:rPr lang="zh-CN" altLang="en-US" dirty="0"/>
+              <a:t>使用</a:t>
+            </a:r>
+            <a:r>
+              <a:rPr lang="en-US" altLang="zh-CN" dirty="0"/>
+              <a:t>U740</a:t>
+            </a:r>
+            <a:r>
+              <a:rPr lang="zh-CN" altLang="en-US" dirty="0"/>
+              <a:t>板上存储</a:t>
+            </a:r>
+            <a:endParaRPr lang="en-US" altLang="zh-CN" dirty="0"/>
+          </a:p>
+          <a:p>
+            <a:r>
+              <a:rPr lang="zh-CN" altLang="en-US" dirty="0"/>
+              <a:t>推进 </a:t>
+            </a:r>
+            <a:r>
+              <a:rPr lang="en-US" altLang="zh-CN" dirty="0" err="1"/>
+              <a:t>syscall</a:t>
+            </a:r>
+            <a:r>
+              <a:rPr lang="zh-CN" altLang="en-US" dirty="0"/>
+              <a:t>：完成对应初赛要求的接口，主要是</a:t>
+            </a:r>
+            <a:r>
+              <a:rPr lang="en-US" altLang="zh-CN" dirty="0"/>
+              <a:t>fs</a:t>
+            </a:r>
+            <a:r>
+              <a:rPr lang="zh-CN" altLang="en-US" dirty="0"/>
+              <a:t>上的操作</a:t>
+            </a:r>
+            <a:endParaRPr lang="en-US" altLang="zh-CN" dirty="0"/>
+          </a:p>
+          <a:p>
+            <a:r>
+              <a:rPr lang="zh-CN" altLang="en-US" dirty="0"/>
+              <a:t>支持之后的内核线程</a:t>
+            </a:r>
+            <a:r>
+              <a:rPr lang="en-US" altLang="zh-CN" dirty="0"/>
+              <a:t>(</a:t>
+            </a:r>
+            <a:r>
+              <a:rPr lang="zh-CN" altLang="en-US" dirty="0"/>
+              <a:t>信号量和条件变量还不确定要不要有</a:t>
+            </a:r>
+            <a:r>
+              <a:rPr lang="en-US" altLang="zh-CN" dirty="0"/>
+              <a:t>)</a:t>
+            </a:r>
+          </a:p>
+          <a:p>
+            <a:r>
+              <a:rPr lang="zh-CN" altLang="en-US" dirty="0"/>
+              <a:t>支持内核协程。目前还没想清楚具体怎么搞</a:t>
+            </a:r>
+            <a:endParaRPr lang="en-US" altLang="zh-CN" dirty="0"/>
+          </a:p>
+        </p:txBody>
+      </p:sp>
+    </p:spTree>
+    <p:extLst>
+      <p:ext uri="{BB962C8B-B14F-4D97-AF65-F5344CB8AC3E}">
+        <p14:creationId xmlns:p14="http://schemas.microsoft.com/office/powerpoint/2010/main" val="1208987280"/>
       </p:ext>
     </p:extLst>
   </p:cSld>
@@ -3452,6 +4270,11 @@
               <a:rPr lang="zh-CN" altLang="en-US" dirty="0"/>
               <a:t>进度</a:t>
             </a:r>
+            <a:r>
+              <a:rPr lang="en-US" altLang="zh-CN" dirty="0"/>
+              <a:t>1</a:t>
+            </a:r>
+            <a:endParaRPr lang="zh-CN" altLang="en-US" dirty="0"/>
           </a:p>
         </p:txBody>
       </p:sp>
@@ -3478,31 +4301,38 @@
           <a:p>
             <a:r>
               <a:rPr lang="zh-CN" altLang="en-US" dirty="0"/>
-              <a:t>修改内核 </a:t>
+              <a:t>对比 </a:t>
             </a:r>
             <a:r>
               <a:rPr lang="en-US" altLang="zh-CN" dirty="0" err="1"/>
-              <a:t>base_address</a:t>
-            </a:r>
-            <a:r>
-              <a:rPr lang="en-US" altLang="zh-CN" dirty="0"/>
-              <a:t> </a:t>
-            </a:r>
-            <a:r>
-              <a:rPr lang="zh-CN" altLang="en-US" dirty="0"/>
-              <a:t>映射和 </a:t>
-            </a:r>
-            <a:r>
-              <a:rPr lang="en-US" altLang="zh-CN" dirty="0"/>
-              <a:t>trap </a:t>
-            </a:r>
-            <a:r>
-              <a:rPr lang="zh-CN" altLang="en-US" dirty="0"/>
-              <a:t>中对内核中断的处理</a:t>
+              <a:t>rCore</a:t>
+            </a:r>
+            <a:r>
+              <a:rPr lang="zh-CN" altLang="en-US" dirty="0"/>
+              <a:t>，相当于支持到 </a:t>
+            </a:r>
+            <a:r>
+              <a:rPr lang="en-US" altLang="zh-CN" dirty="0" err="1"/>
+              <a:t>rCore</a:t>
+            </a:r>
+            <a:r>
+              <a:rPr lang="en-US" altLang="zh-CN" dirty="0"/>
+              <a:t> ch7 </a:t>
+            </a:r>
+            <a:r>
+              <a:rPr lang="zh-CN" altLang="en-US" dirty="0"/>
+              <a:t>的 </a:t>
+            </a:r>
+            <a:r>
+              <a:rPr lang="en-US" altLang="zh-CN" dirty="0" err="1"/>
+              <a:t>syscall</a:t>
             </a:r>
             <a:endParaRPr lang="en-US" altLang="zh-CN" dirty="0"/>
           </a:p>
           <a:p>
+            <a:endParaRPr lang="en-US" altLang="zh-CN" dirty="0"/>
+          </a:p>
+          <a:p>
             <a:r>
               <a:rPr lang="zh-CN" altLang="en-US" dirty="0"/>
               <a:t>重写进程调度，内核里有完整的</a:t>
@@ -3517,7 +4347,7 @@
             </a:r>
             <a:r>
               <a:rPr lang="en-US" altLang="zh-CN" dirty="0"/>
-              <a:t>”(ch5)</a:t>
+              <a:t>”</a:t>
             </a:r>
             <a:r>
               <a:rPr lang="zh-CN" altLang="en-US" dirty="0"/>
@@ -3563,15 +4393,7 @@
             </a:r>
             <a:r>
               <a:rPr lang="zh-CN" altLang="en-US" dirty="0"/>
-              <a:t>，一切读写文件化</a:t>
-            </a:r>
-            <a:r>
-              <a:rPr lang="en-US" altLang="zh-CN" dirty="0"/>
-              <a:t>(ch6)</a:t>
-            </a:r>
-            <a:r>
-              <a:rPr lang="zh-CN" altLang="en-US" dirty="0"/>
-              <a:t>：</a:t>
+              <a:t>，一切读写文件化：</a:t>
             </a:r>
             <a:r>
               <a:rPr lang="en-US" altLang="zh-CN" dirty="0"/>
@@ -3589,15 +4411,27 @@
           <a:p>
             <a:r>
               <a:rPr lang="zh-CN" altLang="en-US" dirty="0"/>
-              <a:t>添加用户进程间交互：可添加管道和复制</a:t>
+              <a:t>添加用户进程间交互：可添加管道、复制</a:t>
             </a:r>
             <a:r>
               <a:rPr lang="en-US" altLang="zh-CN" dirty="0" err="1"/>
               <a:t>fd</a:t>
             </a:r>
             <a:r>
-              <a:rPr lang="en-US" altLang="zh-CN" dirty="0"/>
-              <a:t>(ch7)</a:t>
+              <a:rPr lang="zh-CN" altLang="en-US" dirty="0"/>
+              <a:t>、支持</a:t>
+            </a:r>
+            <a:r>
+              <a:rPr lang="en-US" altLang="zh-CN" dirty="0" err="1"/>
+              <a:t>argc</a:t>
+            </a:r>
+            <a:r>
+              <a:rPr lang="en-US" altLang="zh-CN" dirty="0"/>
+              <a:t>/</a:t>
+            </a:r>
+            <a:r>
+              <a:rPr lang="en-US" altLang="zh-CN" dirty="0" err="1"/>
+              <a:t>argv</a:t>
             </a:r>
             <a:r>
               <a:rPr lang="zh-CN" altLang="en-US" dirty="0"/>
@@ -3615,7 +4449,22 @@
               <a:rPr lang="en-US" altLang="zh-CN" dirty="0" err="1"/>
               <a:t>sys_dup</a:t>
             </a:r>
+            <a:r>
+              <a:rPr lang="en-US" altLang="zh-CN" dirty="0"/>
+              <a:t>/</a:t>
+            </a:r>
+            <a:r>
+              <a:rPr lang="zh-CN" altLang="en-US" dirty="0"/>
+              <a:t>修改的</a:t>
+            </a:r>
+            <a:r>
+              <a:rPr lang="en-US" altLang="zh-CN" dirty="0" err="1"/>
+              <a:t>sys_exec</a:t>
+            </a:r>
             <a:endParaRPr lang="zh-CN" altLang="en-US" dirty="0"/>
+          </a:p>
+          <a:p>
+            <a:endParaRPr lang="en-US" altLang="zh-CN" dirty="0"/>
           </a:p>
         </p:txBody>
       </p:sp>
@@ -3654,7 +4503,7 @@
           <p:cNvPr id="2" name="标题 1">
             <a:extLst>
               <a:ext uri="{FF2B5EF4-FFF2-40B4-BE49-F238E27FC236}">
-                <a16:creationId xmlns:a16="http://schemas.microsoft.com/office/drawing/2014/main" id="{3500CCF3-40C4-4177-830F-A8A177C85E22}"/>
+                <a16:creationId xmlns:a16="http://schemas.microsoft.com/office/drawing/2014/main" id="{73D7CFAD-7049-48B3-B57B-77245362A1F0}"/>
               </a:ext>
             </a:extLst>
           </p:cNvPr>
@@ -3672,16 +4521,13 @@
           <a:p>
             <a:r>
               <a:rPr lang="zh-CN" altLang="en-US" dirty="0"/>
-              <a:t>地址空间映射和</a:t>
-            </a:r>
-            <a:r>
-              <a:rPr lang="en-US" altLang="zh-CN" dirty="0"/>
-              <a:t>trap</a:t>
-            </a:r>
-            <a:r>
-              <a:rPr lang="zh-CN" altLang="en-US" dirty="0"/>
-              <a:t>处理</a:t>
-            </a:r>
+              <a:t>进度</a:t>
+            </a:r>
+            <a:r>
+              <a:rPr lang="en-US" altLang="zh-CN" dirty="0"/>
+              <a:t>2</a:t>
+            </a:r>
+            <a:endParaRPr lang="zh-CN" altLang="en-US" dirty="0"/>
           </a:p>
         </p:txBody>
       </p:sp>
@@ -3690,7 +4536,7 @@
           <p:cNvPr id="3" name="内容占位符 2">
             <a:extLst>
               <a:ext uri="{FF2B5EF4-FFF2-40B4-BE49-F238E27FC236}">
-                <a16:creationId xmlns:a16="http://schemas.microsoft.com/office/drawing/2014/main" id="{5AE3D79F-FB6A-4242-BB69-C71EEE6D2AD7}"/>
+                <a16:creationId xmlns:a16="http://schemas.microsoft.com/office/drawing/2014/main" id="{A2BDD07E-BFA0-4942-903B-3ABB07339879}"/>
               </a:ext>
             </a:extLst>
           </p:cNvPr>
@@ -3708,35 +4554,46 @@
           <a:p>
             <a:r>
               <a:rPr lang="zh-CN" altLang="en-US" dirty="0"/>
-              <a:t>修复了一直以来内核 </a:t>
-            </a:r>
-            <a:r>
-              <a:rPr lang="en-US" altLang="zh-CN" dirty="0"/>
-              <a:t>text </a:t>
-            </a:r>
-            <a:r>
-              <a:rPr lang="zh-CN" altLang="en-US" dirty="0"/>
-              <a:t>段只能放在低地址的 </a:t>
-            </a:r>
-            <a:r>
-              <a:rPr lang="en-US" altLang="zh-CN" dirty="0"/>
-              <a:t>bug</a:t>
-            </a:r>
-            <a:r>
-              <a:rPr lang="zh-CN" altLang="en-US" dirty="0"/>
-              <a:t>，并由此添加了一系列方便调试内核的命令和工具：</a:t>
-            </a:r>
-            <a:r>
-              <a:rPr lang="en-US" altLang="zh-CN" dirty="0"/>
-              <a:t>make </a:t>
+              <a:t>修改内核 </a:t>
             </a:r>
             <a:r>
               <a:rPr lang="en-US" altLang="zh-CN" dirty="0" err="1"/>
-              <a:t>asm</a:t>
-            </a:r>
-            <a:r>
-              <a:rPr lang="en-US" altLang="zh-CN" dirty="0"/>
-              <a:t> / </a:t>
+              <a:t>base_address</a:t>
+            </a:r>
+            <a:r>
+              <a:rPr lang="en-US" altLang="zh-CN" dirty="0"/>
+              <a:t> </a:t>
+            </a:r>
+            <a:r>
+              <a:rPr lang="zh-CN" altLang="en-US" dirty="0"/>
+              <a:t>映射和 </a:t>
+            </a:r>
+            <a:r>
+              <a:rPr lang="en-US" altLang="zh-CN" dirty="0"/>
+              <a:t>trap </a:t>
+            </a:r>
+            <a:r>
+              <a:rPr lang="zh-CN" altLang="en-US" dirty="0"/>
+              <a:t>中对内核中断的处理</a:t>
+            </a:r>
+            <a:endParaRPr lang="en-US" altLang="zh-CN" dirty="0"/>
+          </a:p>
+          <a:p>
+            <a:r>
+              <a:rPr lang="en-US" altLang="zh-CN" dirty="0" err="1"/>
+              <a:t>Makefile</a:t>
+            </a:r>
+            <a:r>
+              <a:rPr lang="en-US" altLang="zh-CN" dirty="0"/>
+              <a:t> </a:t>
+            </a:r>
+            <a:r>
+              <a:rPr lang="zh-CN" altLang="en-US" dirty="0"/>
+              <a:t>里加了反汇编 </a:t>
+            </a:r>
+            <a:r>
+              <a:rPr lang="en-US" altLang="zh-CN" dirty="0"/>
+              <a:t>/ </a:t>
             </a:r>
             <a:r>
               <a:rPr lang="en-US" altLang="zh-CN" dirty="0" err="1"/>
@@ -3744,23 +4601,64 @@
             </a:r>
             <a:r>
               <a:rPr lang="en-US" altLang="zh-CN" dirty="0"/>
-              <a:t>-runner / </a:t>
+              <a:t> / </a:t>
+            </a:r>
+            <a:r>
+              <a:rPr lang="zh-CN" altLang="en-US" dirty="0"/>
+              <a:t>文档，重新写了 </a:t>
+            </a:r>
+            <a:r>
+              <a:rPr lang="en-US" altLang="zh-CN" dirty="0"/>
+              <a:t>trap </a:t>
+            </a:r>
+            <a:r>
+              <a:rPr lang="zh-CN" altLang="en-US" dirty="0"/>
+              <a:t>模块的注释和文档，</a:t>
+            </a:r>
+            <a:r>
+              <a:rPr lang="en-US" altLang="zh-CN" dirty="0"/>
+              <a:t>json</a:t>
+            </a:r>
+            <a:r>
+              <a:rPr lang="zh-CN" altLang="en-US" dirty="0"/>
+              <a:t>格式的</a:t>
+            </a:r>
+            <a:r>
+              <a:rPr lang="en-US" altLang="zh-CN" dirty="0"/>
+              <a:t>target</a:t>
+            </a:r>
+          </a:p>
+          <a:p>
+            <a:r>
+              <a:rPr lang="zh-CN" altLang="en-US" dirty="0"/>
+              <a:t>文件系统模块改成 </a:t>
+            </a:r>
+            <a:r>
+              <a:rPr lang="en-US" altLang="zh-CN" dirty="0"/>
+              <a:t>rust-</a:t>
             </a:r>
             <a:r>
               <a:rPr lang="en-US" altLang="zh-CN" dirty="0" err="1"/>
-              <a:t>gdb</a:t>
-            </a:r>
-            <a:r>
-              <a:rPr lang="en-US" altLang="zh-CN" dirty="0"/>
-              <a:t>-listener </a:t>
-            </a:r>
-            <a:r>
-              <a:rPr lang="zh-CN" altLang="en-US" dirty="0"/>
-              <a:t>， </a:t>
+              <a:t>fatfs</a:t>
+            </a:r>
+            <a:r>
+              <a:rPr lang="zh-CN" altLang="en-US" dirty="0"/>
+              <a:t>，目前只是以一个依赖库的形式存在，也就是用它的接口往上实现功能，但之后还是需要重写的</a:t>
+            </a:r>
+            <a:endParaRPr lang="en-US" altLang="zh-CN" dirty="0"/>
+          </a:p>
+          <a:p>
+            <a:r>
+              <a:rPr lang="zh-CN" altLang="en-US" dirty="0"/>
+              <a:t>写了 </a:t>
+            </a:r>
+            <a:r>
+              <a:rPr lang="en-US" altLang="zh-CN" dirty="0"/>
+              <a:t>fs-</a:t>
             </a:r>
             <a:r>
               <a:rPr lang="en-US" altLang="zh-CN" dirty="0" err="1"/>
-              <a:t>OSResult</a:t>
+              <a:t>init</a:t>
             </a:r>
             <a:r>
               <a:rPr lang="en-US" altLang="zh-CN" dirty="0"/>
@@ -3768,98 +4666,23 @@
             </a:r>
             <a:r>
               <a:rPr lang="zh-CN" altLang="en-US" dirty="0"/>
-              <a:t>和 </a:t>
-            </a:r>
-            <a:r>
-              <a:rPr lang="en-US" altLang="zh-CN" dirty="0" err="1"/>
-              <a:t>OSError</a:t>
-            </a:r>
-            <a:r>
-              <a:rPr lang="en-US" altLang="zh-CN" dirty="0"/>
-              <a:t> </a:t>
-            </a:r>
-            <a:endParaRPr lang="zh-CN" altLang="en-US" dirty="0"/>
-          </a:p>
-          <a:p>
-            <a:r>
-              <a:rPr lang="en-US" altLang="zh-CN" dirty="0"/>
-              <a:t>Trap</a:t>
-            </a:r>
-            <a:r>
-              <a:rPr lang="zh-CN" altLang="en-US" dirty="0"/>
-              <a:t>要正确区分三种情况：用户异常，正在运行用户程序时的内核异常</a:t>
-            </a:r>
-            <a:r>
-              <a:rPr lang="en-US" altLang="zh-CN" dirty="0"/>
-              <a:t>(</a:t>
-            </a:r>
-            <a:r>
-              <a:rPr lang="en-US" altLang="zh-CN" dirty="0" err="1"/>
-              <a:t>sscratch</a:t>
-            </a:r>
-            <a:r>
-              <a:rPr lang="en-US" altLang="zh-CN" dirty="0"/>
-              <a:t>!=0)</a:t>
-            </a:r>
-            <a:r>
-              <a:rPr lang="zh-CN" altLang="en-US" dirty="0"/>
-              <a:t>，当前核空闲时的内核异常</a:t>
-            </a:r>
-            <a:r>
-              <a:rPr lang="en-US" altLang="zh-CN" dirty="0"/>
-              <a:t>(</a:t>
-            </a:r>
-            <a:r>
-              <a:rPr lang="en-US" altLang="zh-CN" dirty="0" err="1"/>
-              <a:t>sscratch</a:t>
-            </a:r>
-            <a:r>
-              <a:rPr lang="en-US" altLang="zh-CN" dirty="0"/>
-              <a:t>=0)</a:t>
-            </a:r>
-          </a:p>
-          <a:p>
-            <a:pPr lvl="1"/>
-            <a:r>
-              <a:rPr lang="zh-CN" altLang="en-US" dirty="0"/>
-              <a:t>其中最后一种情况是有意义的，因为以后加内核线程乃至协程之后，一个在干活的核不一定要有一个</a:t>
-            </a:r>
-            <a:r>
-              <a:rPr lang="en-US" altLang="zh-CN" dirty="0"/>
-              <a:t>”</a:t>
-            </a:r>
-            <a:r>
-              <a:rPr lang="zh-CN" altLang="en-US" dirty="0"/>
-              <a:t>用户程序</a:t>
-            </a:r>
-            <a:r>
-              <a:rPr lang="en-US" altLang="zh-CN" dirty="0"/>
-              <a:t>”</a:t>
-            </a:r>
-          </a:p>
-          <a:p>
-            <a:endParaRPr lang="en-US" altLang="zh-CN" dirty="0"/>
-          </a:p>
-          <a:p>
-            <a:r>
-              <a:rPr lang="zh-CN" altLang="en-US" dirty="0"/>
-              <a:t>是花了时间最多的部分，来龙去脉也非常复杂，还涉及</a:t>
-            </a:r>
-            <a:r>
-              <a:rPr lang="en-US" altLang="zh-CN" dirty="0"/>
-              <a:t>rust</a:t>
-            </a:r>
-            <a:r>
-              <a:rPr lang="zh-CN" altLang="en-US" dirty="0"/>
-              <a:t>编译器本身的问题</a:t>
-            </a:r>
-            <a:r>
-              <a:rPr lang="en-US" altLang="zh-CN" dirty="0"/>
-              <a:t>…</a:t>
-            </a:r>
-            <a:r>
-              <a:rPr lang="zh-CN" altLang="en-US" dirty="0"/>
-              <a:t>有空周四再说吧</a:t>
+              <a:t>模块来生成镜像然后加载用户程序。它代替了原来 </a:t>
+            </a:r>
+            <a:r>
+              <a:rPr lang="en-US" altLang="zh-CN" dirty="0"/>
+              <a:t>easy-fs-fuse </a:t>
+            </a:r>
+            <a:r>
+              <a:rPr lang="zh-CN" altLang="en-US" dirty="0"/>
+              <a:t>的工作，也就是把用户程序放在 </a:t>
+            </a:r>
+            <a:r>
+              <a:rPr lang="en-US" altLang="zh-CN" dirty="0"/>
+              <a:t>fs </a:t>
+            </a:r>
+            <a:r>
+              <a:rPr lang="zh-CN" altLang="en-US" dirty="0"/>
+              <a:t>里而不是跟着一起编译进内核里</a:t>
             </a:r>
           </a:p>
         </p:txBody>
@@ -3867,7 +4690,7 @@
     </p:spTree>
     <p:extLst>
       <p:ext uri="{BB962C8B-B14F-4D97-AF65-F5344CB8AC3E}">
-        <p14:creationId xmlns:p14="http://schemas.microsoft.com/office/powerpoint/2010/main" val="586867286"/>
+        <p14:creationId xmlns:p14="http://schemas.microsoft.com/office/powerpoint/2010/main" val="1520164211"/>
       </p:ext>
     </p:extLst>
   </p:cSld>
@@ -3899,7 +4722,7 @@
           <p:cNvPr id="2" name="标题 1">
             <a:extLst>
               <a:ext uri="{FF2B5EF4-FFF2-40B4-BE49-F238E27FC236}">
-                <a16:creationId xmlns:a16="http://schemas.microsoft.com/office/drawing/2014/main" id="{A108C52C-1C93-4517-89D6-BA29BB041AE9}"/>
+                <a16:creationId xmlns:a16="http://schemas.microsoft.com/office/drawing/2014/main" id="{3500CCF3-40C4-4177-830F-A8A177C85E22}"/>
               </a:ext>
             </a:extLst>
           </p:cNvPr>
@@ -3916,114 +4739,200 @@
           <a:lstStyle/>
           <a:p>
             <a:r>
-              <a:rPr lang="en-US" altLang="zh-CN" dirty="0"/>
-              <a:t>ch5/ch6/ch7</a:t>
+              <a:rPr lang="zh-CN" altLang="en-US" dirty="0"/>
+              <a:t>地址空间映射和</a:t>
+            </a:r>
+            <a:r>
+              <a:rPr lang="en-US" altLang="zh-CN" dirty="0"/>
+              <a:t>trap</a:t>
+            </a:r>
+            <a:r>
+              <a:rPr lang="zh-CN" altLang="en-US" dirty="0"/>
+              <a:t>处理</a:t>
+            </a:r>
+          </a:p>
+        </p:txBody>
+      </p:sp>
+      <p:sp>
+        <p:nvSpPr>
+          <p:cNvPr id="3" name="内容占位符 2">
+            <a:extLst>
+              <a:ext uri="{FF2B5EF4-FFF2-40B4-BE49-F238E27FC236}">
+                <a16:creationId xmlns:a16="http://schemas.microsoft.com/office/drawing/2014/main" id="{5AE3D79F-FB6A-4242-BB69-C71EEE6D2AD7}"/>
+              </a:ext>
+            </a:extLst>
+          </p:cNvPr>
+          <p:cNvSpPr>
+            <a:spLocks noGrp="1"/>
+          </p:cNvSpPr>
+          <p:nvPr>
+            <p:ph idx="1"/>
+          </p:nvPr>
+        </p:nvSpPr>
+        <p:spPr>
+          <a:xfrm>
+            <a:off x="838200" y="1825625"/>
+            <a:ext cx="10515600" cy="4351338"/>
+          </a:xfrm>
+        </p:spPr>
+        <p:txBody>
+          <a:bodyPr/>
+          <a:lstStyle/>
+          <a:p>
+            <a:r>
+              <a:rPr lang="zh-CN" altLang="en-US" dirty="0"/>
+              <a:t>修复了一直以来内核 </a:t>
+            </a:r>
+            <a:r>
+              <a:rPr lang="en-US" altLang="zh-CN" dirty="0"/>
+              <a:t>text </a:t>
+            </a:r>
+            <a:r>
+              <a:rPr lang="zh-CN" altLang="en-US" dirty="0"/>
+              <a:t>段只能放在低地址的 </a:t>
+            </a:r>
+            <a:r>
+              <a:rPr lang="en-US" altLang="zh-CN" dirty="0"/>
+              <a:t>bug</a:t>
+            </a:r>
+            <a:r>
+              <a:rPr lang="zh-CN" altLang="en-US" dirty="0"/>
+              <a:t>，并由此添加了一系列方便调试内核的命令和工具：</a:t>
+            </a:r>
+            <a:r>
+              <a:rPr lang="en-US" altLang="zh-CN" dirty="0"/>
+              <a:t>make </a:t>
+            </a:r>
+            <a:r>
+              <a:rPr lang="en-US" altLang="zh-CN" dirty="0" err="1"/>
+              <a:t>asm</a:t>
+            </a:r>
+            <a:r>
+              <a:rPr lang="en-US" altLang="zh-CN" dirty="0"/>
+              <a:t> / </a:t>
+            </a:r>
+            <a:r>
+              <a:rPr lang="en-US" altLang="zh-CN" dirty="0" err="1"/>
+              <a:t>gdb</a:t>
+            </a:r>
+            <a:r>
+              <a:rPr lang="en-US" altLang="zh-CN" dirty="0"/>
+              <a:t>-runner / </a:t>
+            </a:r>
+            <a:r>
+              <a:rPr lang="en-US" altLang="zh-CN" dirty="0" err="1"/>
+              <a:t>gdb</a:t>
+            </a:r>
+            <a:r>
+              <a:rPr lang="en-US" altLang="zh-CN" dirty="0"/>
+              <a:t>-listener </a:t>
+            </a:r>
+            <a:r>
+              <a:rPr lang="zh-CN" altLang="en-US" dirty="0"/>
+              <a:t>， </a:t>
+            </a:r>
+            <a:r>
+              <a:rPr lang="en-US" altLang="zh-CN" dirty="0" err="1"/>
+              <a:t>OSResult</a:t>
+            </a:r>
+            <a:r>
+              <a:rPr lang="en-US" altLang="zh-CN" dirty="0"/>
+              <a:t> </a:t>
+            </a:r>
+            <a:r>
+              <a:rPr lang="zh-CN" altLang="en-US" dirty="0"/>
+              <a:t>和 </a:t>
+            </a:r>
+            <a:r>
+              <a:rPr lang="en-US" altLang="zh-CN" dirty="0" err="1"/>
+              <a:t>OSError</a:t>
+            </a:r>
+            <a:r>
+              <a:rPr lang="en-US" altLang="zh-CN" dirty="0"/>
+              <a:t> </a:t>
             </a:r>
             <a:endParaRPr lang="zh-CN" altLang="en-US" dirty="0"/>
           </a:p>
-        </p:txBody>
-      </p:sp>
-      <p:sp>
-        <p:nvSpPr>
-          <p:cNvPr id="3" name="内容占位符 2">
-            <a:extLst>
-              <a:ext uri="{FF2B5EF4-FFF2-40B4-BE49-F238E27FC236}">
-                <a16:creationId xmlns:a16="http://schemas.microsoft.com/office/drawing/2014/main" id="{229F13D7-247C-41BB-B7EB-CA2461B0BE2C}"/>
-              </a:ext>
-            </a:extLst>
-          </p:cNvPr>
-          <p:cNvSpPr>
-            <a:spLocks noGrp="1"/>
-          </p:cNvSpPr>
-          <p:nvPr>
-            <p:ph idx="1"/>
-          </p:nvPr>
-        </p:nvSpPr>
-        <p:spPr/>
-        <p:txBody>
-          <a:bodyPr/>
-          <a:lstStyle/>
-          <a:p>
-            <a:r>
-              <a:rPr lang="zh-CN" altLang="en-US" dirty="0"/>
-              <a:t>参考了很多 </a:t>
+          <a:p>
+            <a:r>
+              <a:rPr lang="en-US" altLang="zh-CN" dirty="0"/>
+              <a:t>Trap</a:t>
+            </a:r>
+            <a:r>
+              <a:rPr lang="zh-CN" altLang="en-US" dirty="0"/>
+              <a:t>要正确区分三种情况：用户异常，正在运行用户程序时的内核异常</a:t>
+            </a:r>
+            <a:r>
+              <a:rPr lang="en-US" altLang="zh-CN" dirty="0"/>
+              <a:t>(</a:t>
             </a:r>
             <a:r>
               <a:rPr lang="en-US" altLang="zh-CN" dirty="0" err="1"/>
-              <a:t>rCore</a:t>
-            </a:r>
-            <a:r>
-              <a:rPr lang="en-US" altLang="zh-CN" dirty="0"/>
-              <a:t> </a:t>
-            </a:r>
-            <a:r>
-              <a:rPr lang="zh-CN" altLang="en-US" dirty="0"/>
-              <a:t>的内容，可能一眼看上去跟 </a:t>
+              <a:t>sscratch</a:t>
+            </a:r>
+            <a:r>
+              <a:rPr lang="en-US" altLang="zh-CN" dirty="0"/>
+              <a:t>!=0)</a:t>
+            </a:r>
+            <a:r>
+              <a:rPr lang="zh-CN" altLang="en-US" dirty="0"/>
+              <a:t>，当前核空闲时的内核异常</a:t>
+            </a:r>
+            <a:r>
+              <a:rPr lang="en-US" altLang="zh-CN" dirty="0"/>
+              <a:t>(</a:t>
             </a:r>
             <a:r>
               <a:rPr lang="en-US" altLang="zh-CN" dirty="0" err="1"/>
-              <a:t>rCore</a:t>
-            </a:r>
-            <a:r>
-              <a:rPr lang="en-US" altLang="zh-CN" dirty="0"/>
-              <a:t> </a:t>
-            </a:r>
-            <a:r>
-              <a:rPr lang="zh-CN" altLang="en-US" dirty="0"/>
-              <a:t>有八成像，但很多结构上的设计是不同的。</a:t>
-            </a:r>
+              <a:t>sscratch</a:t>
+            </a:r>
+            <a:r>
+              <a:rPr lang="en-US" altLang="zh-CN" dirty="0"/>
+              <a:t>=0)</a:t>
+            </a:r>
+          </a:p>
+          <a:p>
+            <a:pPr lvl="1"/>
+            <a:r>
+              <a:rPr lang="zh-CN" altLang="en-US" dirty="0"/>
+              <a:t>其中最后一种情况是有意义的，因为以后加内核线程乃至协程之后，一个在干活的核不一定要有一个</a:t>
+            </a:r>
+            <a:r>
+              <a:rPr lang="en-US" altLang="zh-CN" dirty="0"/>
+              <a:t>”</a:t>
+            </a:r>
+            <a:r>
+              <a:rPr lang="zh-CN" altLang="en-US" dirty="0"/>
+              <a:t>用户程序</a:t>
+            </a:r>
+            <a:r>
+              <a:rPr lang="en-US" altLang="zh-CN" dirty="0"/>
+              <a:t>”</a:t>
+            </a:r>
+          </a:p>
+          <a:p>
             <a:endParaRPr lang="en-US" altLang="zh-CN" dirty="0"/>
           </a:p>
           <a:p>
             <a:r>
               <a:rPr lang="zh-CN" altLang="en-US" dirty="0"/>
-              <a:t>我们终究不是要做一个</a:t>
-            </a:r>
-            <a:r>
-              <a:rPr lang="en-US" altLang="zh-CN" dirty="0"/>
-              <a:t>”</a:t>
-            </a:r>
-            <a:r>
-              <a:rPr lang="zh-CN" altLang="en-US" dirty="0"/>
-              <a:t>多核</a:t>
-            </a:r>
-            <a:r>
-              <a:rPr lang="en-US" altLang="zh-CN" dirty="0" err="1"/>
-              <a:t>rCore</a:t>
-            </a:r>
-            <a:r>
-              <a:rPr lang="en-US" altLang="zh-CN" dirty="0"/>
-              <a:t>”</a:t>
-            </a:r>
-            <a:r>
-              <a:rPr lang="zh-CN" altLang="en-US" dirty="0"/>
-              <a:t>，而是要写一个新内核。不过目前和别人做的不一样的地方都比较细节，很难概况哪些是创新点。代码里有一些我写了十行甚至更多注释的函数，分布在各个文件里，那些就是把设计的 </a:t>
-            </a:r>
-            <a:r>
-              <a:rPr lang="en-US" altLang="zh-CN" dirty="0"/>
-              <a:t>idea </a:t>
-            </a:r>
-            <a:r>
-              <a:rPr lang="zh-CN" altLang="en-US" dirty="0"/>
-              <a:t>都写进去了。</a:t>
-            </a:r>
-            <a:endParaRPr lang="en-US" altLang="zh-CN" dirty="0"/>
-          </a:p>
-          <a:p>
-            <a:endParaRPr lang="en-US" altLang="zh-CN" dirty="0"/>
-          </a:p>
-          <a:p>
-            <a:r>
-              <a:rPr lang="zh-CN" altLang="en-US" dirty="0"/>
-              <a:t>顺便一</a:t>
-            </a:r>
-            <a:r>
-              <a:rPr lang="zh-CN" altLang="en-US"/>
-              <a:t>提，目前项目的设计文档因为</a:t>
-            </a:r>
-            <a:r>
-              <a:rPr lang="zh-CN" altLang="en-US" dirty="0"/>
-              <a:t>调度器的重构已经过时了，需要尽快更新</a:t>
+              <a:t>是花了时间最多的部分，还涉及</a:t>
+            </a:r>
+            <a:r>
+              <a:rPr lang="en-US" altLang="zh-CN" dirty="0"/>
+              <a:t>rust</a:t>
+            </a:r>
+            <a:r>
+              <a:rPr lang="zh-CN" altLang="en-US" dirty="0"/>
+              <a:t>编译器本身的问题</a:t>
+            </a:r>
+            <a:r>
+              <a:rPr lang="en-US" altLang="zh-CN" dirty="0"/>
+              <a:t>…</a:t>
+            </a:r>
+            <a:r>
+              <a:rPr lang="zh-CN" altLang="en-US" dirty="0"/>
+              <a:t>尝试手动讲一下</a:t>
             </a:r>
           </a:p>
         </p:txBody>
@@ -4031,7 +4940,7 @@
     </p:spTree>
     <p:extLst>
       <p:ext uri="{BB962C8B-B14F-4D97-AF65-F5344CB8AC3E}">
-        <p14:creationId xmlns:p14="http://schemas.microsoft.com/office/powerpoint/2010/main" val="2753600860"/>
+        <p14:creationId xmlns:p14="http://schemas.microsoft.com/office/powerpoint/2010/main" val="586867286"/>
       </p:ext>
     </p:extLst>
   </p:cSld>
@@ -4063,7 +4972,7 @@
           <p:cNvPr id="2" name="标题 1">
             <a:extLst>
               <a:ext uri="{FF2B5EF4-FFF2-40B4-BE49-F238E27FC236}">
-                <a16:creationId xmlns:a16="http://schemas.microsoft.com/office/drawing/2014/main" id="{4EBECA97-D42D-49DE-86BE-B25A9C006C6F}"/>
+                <a16:creationId xmlns:a16="http://schemas.microsoft.com/office/drawing/2014/main" id="{CB715EA8-257A-46CA-B59C-B1DDB7AD3813}"/>
               </a:ext>
             </a:extLst>
           </p:cNvPr>
@@ -4080,10 +4989,13 @@
           <a:lstStyle/>
           <a:p>
             <a:r>
-              <a:rPr lang="en-US" altLang="zh-CN" dirty="0" err="1"/>
-              <a:t>Todo</a:t>
-            </a:r>
-            <a:endParaRPr lang="zh-CN" altLang="en-US" dirty="0"/>
+              <a:rPr lang="en-US" altLang="zh-CN" dirty="0"/>
+              <a:t>Bug</a:t>
+            </a:r>
+            <a:r>
+              <a:rPr lang="zh-CN" altLang="en-US" dirty="0"/>
+              <a:t>说明</a:t>
+            </a:r>
           </a:p>
         </p:txBody>
       </p:sp>
@@ -4092,7 +5004,7 @@
           <p:cNvPr id="3" name="内容占位符 2">
             <a:extLst>
               <a:ext uri="{FF2B5EF4-FFF2-40B4-BE49-F238E27FC236}">
-                <a16:creationId xmlns:a16="http://schemas.microsoft.com/office/drawing/2014/main" id="{6285D6C3-5B79-4857-9520-391E1CD66A63}"/>
+                <a16:creationId xmlns:a16="http://schemas.microsoft.com/office/drawing/2014/main" id="{4EDB03E1-A5A9-4873-ADDA-C8FAAB5443B7}"/>
               </a:ext>
             </a:extLst>
           </p:cNvPr>
@@ -4110,90 +5022,808 @@
           <a:p>
             <a:r>
               <a:rPr lang="zh-CN" altLang="en-US" dirty="0"/>
-              <a:t>使用</a:t>
-            </a:r>
-            <a:r>
-              <a:rPr lang="en-US" altLang="zh-CN" dirty="0"/>
-              <a:t>U740</a:t>
-            </a:r>
-            <a:r>
-              <a:rPr lang="zh-CN" altLang="en-US" dirty="0"/>
-              <a:t>板上存储：目前文件系统是 </a:t>
-            </a:r>
-            <a:r>
-              <a:rPr lang="en-US" altLang="zh-CN" dirty="0"/>
-              <a:t>kernel -&gt; easy-fs -&gt; </a:t>
-            </a:r>
-            <a:r>
-              <a:rPr lang="en-US" altLang="zh-CN" dirty="0" err="1"/>
-              <a:t>virtIOBlk</a:t>
-            </a:r>
-            <a:r>
-              <a:rPr lang="zh-CN" altLang="en-US" dirty="0"/>
-              <a:t>。虽然还没想好要不要换掉</a:t>
-            </a:r>
-            <a:r>
-              <a:rPr lang="en-US" altLang="zh-CN" dirty="0"/>
-              <a:t> easy-fs </a:t>
-            </a:r>
-            <a:r>
-              <a:rPr lang="zh-CN" altLang="en-US" dirty="0"/>
-              <a:t>或者重写，但至少底层的块设备跟上面是没什么依赖关系的。</a:t>
-            </a:r>
-            <a:endParaRPr lang="en-US" altLang="zh-CN" dirty="0"/>
-          </a:p>
-          <a:p>
-            <a:r>
-              <a:rPr lang="zh-CN" altLang="en-US" dirty="0"/>
-              <a:t>继续推进 </a:t>
-            </a:r>
-            <a:r>
-              <a:rPr lang="en-US" altLang="zh-CN" dirty="0" err="1"/>
-              <a:t>syscall</a:t>
-            </a:r>
-            <a:r>
-              <a:rPr lang="zh-CN" altLang="en-US" dirty="0"/>
-              <a:t>：修改 </a:t>
-            </a:r>
-            <a:r>
-              <a:rPr lang="en-US" altLang="zh-CN" dirty="0" err="1"/>
-              <a:t>sys_exec</a:t>
-            </a:r>
-            <a:r>
-              <a:rPr lang="zh-CN" altLang="en-US" dirty="0"/>
-              <a:t>，以便支持用户程序的</a:t>
-            </a:r>
-            <a:r>
-              <a:rPr lang="en-US" altLang="zh-CN" dirty="0" err="1"/>
-              <a:t>argc</a:t>
-            </a:r>
-            <a:r>
-              <a:rPr lang="en-US" altLang="zh-CN" dirty="0"/>
-              <a:t>/</a:t>
-            </a:r>
-            <a:r>
-              <a:rPr lang="en-US" altLang="zh-CN" dirty="0" err="1"/>
-              <a:t>argv</a:t>
-            </a:r>
-            <a:r>
-              <a:rPr lang="zh-CN" altLang="en-US" dirty="0"/>
-              <a:t>；以及之后的内核线程</a:t>
-            </a:r>
-            <a:endParaRPr lang="en-US" altLang="zh-CN" dirty="0"/>
-          </a:p>
-          <a:p>
-            <a:r>
-              <a:rPr lang="zh-CN" altLang="en-US" dirty="0"/>
-              <a:t>支持内核协程。应该是整个项目的重头戏，但目前说实话还没想清楚具体怎么搞</a:t>
-            </a:r>
-            <a:endParaRPr lang="en-US" altLang="zh-CN" dirty="0"/>
+              <a:t>在第</a:t>
+            </a:r>
+            <a:r>
+              <a:rPr lang="en-US" altLang="zh-CN" dirty="0"/>
+              <a:t>10</a:t>
+            </a:r>
+            <a:r>
+              <a:rPr lang="zh-CN" altLang="en-US" dirty="0"/>
+              <a:t>周交流时讲到，在用户程序的内核态调用汇编</a:t>
+            </a:r>
+            <a:r>
+              <a:rPr lang="en-US" altLang="zh-CN" dirty="0"/>
+              <a:t>(</a:t>
+            </a:r>
+            <a:r>
+              <a:rPr lang="zh-CN" altLang="en-US" dirty="0"/>
+              <a:t>如</a:t>
+            </a:r>
+            <a:r>
+              <a:rPr lang="en-US" altLang="zh-CN" dirty="0"/>
+              <a:t>linker</a:t>
+            </a:r>
+            <a:r>
+              <a:rPr lang="zh-CN" altLang="en-US" dirty="0"/>
+              <a:t>中</a:t>
+            </a:r>
+            <a:r>
+              <a:rPr lang="en-US" altLang="zh-CN" dirty="0"/>
+              <a:t>)</a:t>
+            </a:r>
+            <a:r>
+              <a:rPr lang="zh-CN" altLang="en-US" dirty="0"/>
+              <a:t>的符号，有时输出低地址</a:t>
+            </a:r>
+            <a:r>
+              <a:rPr lang="en-US" altLang="zh-CN" dirty="0"/>
+              <a:t>(0x8020…)</a:t>
+            </a:r>
+            <a:r>
+              <a:rPr lang="zh-CN" altLang="en-US" dirty="0"/>
+              <a:t>，有时输出高地址</a:t>
+            </a:r>
+            <a:r>
+              <a:rPr lang="en-US" altLang="zh-CN" dirty="0"/>
+              <a:t>(0xffff_ffff_8020_0000)</a:t>
+            </a:r>
           </a:p>
         </p:txBody>
       </p:sp>
     </p:spTree>
     <p:extLst>
       <p:ext uri="{BB962C8B-B14F-4D97-AF65-F5344CB8AC3E}">
-        <p14:creationId xmlns:p14="http://schemas.microsoft.com/office/powerpoint/2010/main" val="1208987280"/>
+        <p14:creationId xmlns:p14="http://schemas.microsoft.com/office/powerpoint/2010/main" val="4239353707"/>
+      </p:ext>
+    </p:extLst>
+  </p:cSld>
+  <p:clrMapOvr>
+    <a:masterClrMapping/>
+  </p:clrMapOvr>
+</p:sld>
+</file>
+
+<file path=ppt/slides/slide6.xml><?xml version="1.0" encoding="utf-8"?>
+<p:sld xmlns:a="http://schemas.openxmlformats.org/drawingml/2006/main" xmlns:r="http://schemas.openxmlformats.org/officeDocument/2006/relationships" xmlns:p="http://schemas.openxmlformats.org/presentationml/2006/main">
+  <p:cSld>
+    <p:spTree>
+      <p:nvGrpSpPr>
+        <p:cNvPr id="1" name=""/>
+        <p:cNvGrpSpPr/>
+        <p:nvPr/>
+      </p:nvGrpSpPr>
+      <p:grpSpPr>
+        <a:xfrm>
+          <a:off x="0" y="0"/>
+          <a:ext cx="0" cy="0"/>
+          <a:chOff x="0" y="0"/>
+          <a:chExt cx="0" cy="0"/>
+        </a:xfrm>
+      </p:grpSpPr>
+      <p:sp>
+        <p:nvSpPr>
+          <p:cNvPr id="2" name="标题 1">
+            <a:extLst>
+              <a:ext uri="{FF2B5EF4-FFF2-40B4-BE49-F238E27FC236}">
+                <a16:creationId xmlns:a16="http://schemas.microsoft.com/office/drawing/2014/main" id="{D1CA7794-6960-47DF-A3E3-66A0F875F89F}"/>
+              </a:ext>
+            </a:extLst>
+          </p:cNvPr>
+          <p:cNvSpPr>
+            <a:spLocks noGrp="1"/>
+          </p:cNvSpPr>
+          <p:nvPr>
+            <p:ph type="title"/>
+          </p:nvPr>
+        </p:nvSpPr>
+        <p:spPr/>
+        <p:txBody>
+          <a:bodyPr/>
+          <a:lstStyle/>
+          <a:p>
+            <a:endParaRPr lang="zh-CN" altLang="en-US"/>
+          </a:p>
+        </p:txBody>
+      </p:sp>
+      <p:pic>
+        <p:nvPicPr>
+          <p:cNvPr id="7" name="内容占位符 6">
+            <a:extLst>
+              <a:ext uri="{FF2B5EF4-FFF2-40B4-BE49-F238E27FC236}">
+                <a16:creationId xmlns:a16="http://schemas.microsoft.com/office/drawing/2014/main" id="{0454BFB1-C5AA-4DFC-B10F-A807D275B7BC}"/>
+              </a:ext>
+            </a:extLst>
+          </p:cNvPr>
+          <p:cNvPicPr>
+            <a:picLocks noGrp="1" noChangeAspect="1"/>
+          </p:cNvPicPr>
+          <p:nvPr>
+            <p:ph idx="1"/>
+          </p:nvPr>
+        </p:nvPicPr>
+        <p:blipFill>
+          <a:blip r:embed="rId2">
+            <a:extLst>
+              <a:ext uri="{28A0092B-C50C-407E-A947-70E740481C1C}">
+                <a14:useLocalDpi xmlns:a14="http://schemas.microsoft.com/office/drawing/2010/main" val="0"/>
+              </a:ext>
+            </a:extLst>
+          </a:blip>
+          <a:stretch>
+            <a:fillRect/>
+          </a:stretch>
+        </p:blipFill>
+        <p:spPr>
+          <a:xfrm>
+            <a:off x="1058598" y="0"/>
+            <a:ext cx="9082335" cy="6821199"/>
+          </a:xfrm>
+        </p:spPr>
+      </p:pic>
+    </p:spTree>
+    <p:extLst>
+      <p:ext uri="{BB962C8B-B14F-4D97-AF65-F5344CB8AC3E}">
+        <p14:creationId xmlns:p14="http://schemas.microsoft.com/office/powerpoint/2010/main" val="1996944140"/>
+      </p:ext>
+    </p:extLst>
+  </p:cSld>
+  <p:clrMapOvr>
+    <a:masterClrMapping/>
+  </p:clrMapOvr>
+</p:sld>
+</file>
+
+<file path=ppt/slides/slide7.xml><?xml version="1.0" encoding="utf-8"?>
+<p:sld xmlns:a="http://schemas.openxmlformats.org/drawingml/2006/main" xmlns:r="http://schemas.openxmlformats.org/officeDocument/2006/relationships" xmlns:p="http://schemas.openxmlformats.org/presentationml/2006/main">
+  <p:cSld>
+    <p:spTree>
+      <p:nvGrpSpPr>
+        <p:cNvPr id="1" name=""/>
+        <p:cNvGrpSpPr/>
+        <p:nvPr/>
+      </p:nvGrpSpPr>
+      <p:grpSpPr>
+        <a:xfrm>
+          <a:off x="0" y="0"/>
+          <a:ext cx="0" cy="0"/>
+          <a:chOff x="0" y="0"/>
+          <a:chExt cx="0" cy="0"/>
+        </a:xfrm>
+      </p:grpSpPr>
+      <p:sp>
+        <p:nvSpPr>
+          <p:cNvPr id="2" name="标题 1">
+            <a:extLst>
+              <a:ext uri="{FF2B5EF4-FFF2-40B4-BE49-F238E27FC236}">
+                <a16:creationId xmlns:a16="http://schemas.microsoft.com/office/drawing/2014/main" id="{74726657-79A2-453B-8B6C-342F83C76977}"/>
+              </a:ext>
+            </a:extLst>
+          </p:cNvPr>
+          <p:cNvSpPr>
+            <a:spLocks noGrp="1"/>
+          </p:cNvSpPr>
+          <p:nvPr>
+            <p:ph type="title"/>
+          </p:nvPr>
+        </p:nvSpPr>
+        <p:spPr/>
+        <p:txBody>
+          <a:bodyPr/>
+          <a:lstStyle/>
+          <a:p>
+            <a:endParaRPr lang="zh-CN" altLang="en-US"/>
+          </a:p>
+        </p:txBody>
+      </p:sp>
+      <p:pic>
+        <p:nvPicPr>
+          <p:cNvPr id="7" name="内容占位符 6">
+            <a:extLst>
+              <a:ext uri="{FF2B5EF4-FFF2-40B4-BE49-F238E27FC236}">
+                <a16:creationId xmlns:a16="http://schemas.microsoft.com/office/drawing/2014/main" id="{515FF371-16AE-4887-ABC3-391EDFDFCD53}"/>
+              </a:ext>
+            </a:extLst>
+          </p:cNvPr>
+          <p:cNvPicPr>
+            <a:picLocks noGrp="1" noChangeAspect="1"/>
+          </p:cNvPicPr>
+          <p:nvPr>
+            <p:ph idx="1"/>
+          </p:nvPr>
+        </p:nvPicPr>
+        <p:blipFill>
+          <a:blip r:embed="rId2">
+            <a:extLst>
+              <a:ext uri="{28A0092B-C50C-407E-A947-70E740481C1C}">
+                <a14:useLocalDpi xmlns:a14="http://schemas.microsoft.com/office/drawing/2010/main" val="0"/>
+              </a:ext>
+            </a:extLst>
+          </a:blip>
+          <a:stretch>
+            <a:fillRect/>
+          </a:stretch>
+        </p:blipFill>
+        <p:spPr>
+          <a:xfrm>
+            <a:off x="1668369" y="402937"/>
+            <a:ext cx="8209709" cy="3266081"/>
+          </a:xfrm>
+        </p:spPr>
+      </p:pic>
+      <p:sp>
+        <p:nvSpPr>
+          <p:cNvPr id="8" name="内容占位符 2">
+            <a:extLst>
+              <a:ext uri="{FF2B5EF4-FFF2-40B4-BE49-F238E27FC236}">
+                <a16:creationId xmlns:a16="http://schemas.microsoft.com/office/drawing/2014/main" id="{1D86028B-5292-4B23-9A00-730FA3CBCFDC}"/>
+              </a:ext>
+            </a:extLst>
+          </p:cNvPr>
+          <p:cNvSpPr txBox="1">
+            <a:spLocks/>
+          </p:cNvSpPr>
+          <p:nvPr/>
+        </p:nvSpPr>
+        <p:spPr>
+          <a:xfrm>
+            <a:off x="838200" y="4451061"/>
+            <a:ext cx="10515600" cy="2406939"/>
+          </a:xfrm>
+          <a:prstGeom prst="rect">
+            <a:avLst/>
+          </a:prstGeom>
+        </p:spPr>
+        <p:txBody>
+          <a:bodyPr vert="horz" lIns="91440" tIns="45720" rIns="91440" bIns="45720" rtlCol="0">
+            <a:normAutofit/>
+          </a:bodyPr>
+          <a:lstStyle>
+            <a:lvl1pPr marL="228600" indent="-228600" algn="l" defTabSz="914400" rtl="0" eaLnBrk="1" latinLnBrk="0" hangingPunct="1">
+              <a:lnSpc>
+                <a:spcPct val="90000"/>
+              </a:lnSpc>
+              <a:spcBef>
+                <a:spcPts val="1000"/>
+              </a:spcBef>
+              <a:buFont typeface="Arial" panose="020B0604020202020204" pitchFamily="34" charset="0"/>
+              <a:buChar char="•"/>
+              <a:defRPr sz="2800" kern="1200">
+                <a:solidFill>
+                  <a:schemeClr val="tx1"/>
+                </a:solidFill>
+                <a:latin typeface="+mn-lt"/>
+                <a:ea typeface="+mn-ea"/>
+                <a:cs typeface="+mn-cs"/>
+              </a:defRPr>
+            </a:lvl1pPr>
+            <a:lvl2pPr marL="685800" indent="-228600" algn="l" defTabSz="914400" rtl="0" eaLnBrk="1" latinLnBrk="0" hangingPunct="1">
+              <a:lnSpc>
+                <a:spcPct val="90000"/>
+              </a:lnSpc>
+              <a:spcBef>
+                <a:spcPts val="500"/>
+              </a:spcBef>
+              <a:buFont typeface="Arial" panose="020B0604020202020204" pitchFamily="34" charset="0"/>
+              <a:buChar char="•"/>
+              <a:defRPr sz="2400" kern="1200">
+                <a:solidFill>
+                  <a:schemeClr val="tx1"/>
+                </a:solidFill>
+                <a:latin typeface="+mn-lt"/>
+                <a:ea typeface="+mn-ea"/>
+                <a:cs typeface="+mn-cs"/>
+              </a:defRPr>
+            </a:lvl2pPr>
+            <a:lvl3pPr marL="1143000" indent="-228600" algn="l" defTabSz="914400" rtl="0" eaLnBrk="1" latinLnBrk="0" hangingPunct="1">
+              <a:lnSpc>
+                <a:spcPct val="90000"/>
+              </a:lnSpc>
+              <a:spcBef>
+                <a:spcPts val="500"/>
+              </a:spcBef>
+              <a:buFont typeface="Arial" panose="020B0604020202020204" pitchFamily="34" charset="0"/>
+              <a:buChar char="•"/>
+              <a:defRPr sz="2000" kern="1200">
+                <a:solidFill>
+                  <a:schemeClr val="tx1"/>
+                </a:solidFill>
+                <a:latin typeface="+mn-lt"/>
+                <a:ea typeface="+mn-ea"/>
+                <a:cs typeface="+mn-cs"/>
+              </a:defRPr>
+            </a:lvl3pPr>
+            <a:lvl4pPr marL="1600200" indent="-228600" algn="l" defTabSz="914400" rtl="0" eaLnBrk="1" latinLnBrk="0" hangingPunct="1">
+              <a:lnSpc>
+                <a:spcPct val="90000"/>
+              </a:lnSpc>
+              <a:spcBef>
+                <a:spcPts val="500"/>
+              </a:spcBef>
+              <a:buFont typeface="Arial" panose="020B0604020202020204" pitchFamily="34" charset="0"/>
+              <a:buChar char="•"/>
+              <a:defRPr sz="1800" kern="1200">
+                <a:solidFill>
+                  <a:schemeClr val="tx1"/>
+                </a:solidFill>
+                <a:latin typeface="+mn-lt"/>
+                <a:ea typeface="+mn-ea"/>
+                <a:cs typeface="+mn-cs"/>
+              </a:defRPr>
+            </a:lvl4pPr>
+            <a:lvl5pPr marL="2057400" indent="-228600" algn="l" defTabSz="914400" rtl="0" eaLnBrk="1" latinLnBrk="0" hangingPunct="1">
+              <a:lnSpc>
+                <a:spcPct val="90000"/>
+              </a:lnSpc>
+              <a:spcBef>
+                <a:spcPts val="500"/>
+              </a:spcBef>
+              <a:buFont typeface="Arial" panose="020B0604020202020204" pitchFamily="34" charset="0"/>
+              <a:buChar char="•"/>
+              <a:defRPr sz="1800" kern="1200">
+                <a:solidFill>
+                  <a:schemeClr val="tx1"/>
+                </a:solidFill>
+                <a:latin typeface="+mn-lt"/>
+                <a:ea typeface="+mn-ea"/>
+                <a:cs typeface="+mn-cs"/>
+              </a:defRPr>
+            </a:lvl5pPr>
+            <a:lvl6pPr marL="2514600" indent="-228600" algn="l" defTabSz="914400" rtl="0" eaLnBrk="1" latinLnBrk="0" hangingPunct="1">
+              <a:lnSpc>
+                <a:spcPct val="90000"/>
+              </a:lnSpc>
+              <a:spcBef>
+                <a:spcPts val="500"/>
+              </a:spcBef>
+              <a:buFont typeface="Arial" panose="020B0604020202020204" pitchFamily="34" charset="0"/>
+              <a:buChar char="•"/>
+              <a:defRPr sz="1800" kern="1200">
+                <a:solidFill>
+                  <a:schemeClr val="tx1"/>
+                </a:solidFill>
+                <a:latin typeface="+mn-lt"/>
+                <a:ea typeface="+mn-ea"/>
+                <a:cs typeface="+mn-cs"/>
+              </a:defRPr>
+            </a:lvl6pPr>
+            <a:lvl7pPr marL="2971800" indent="-228600" algn="l" defTabSz="914400" rtl="0" eaLnBrk="1" latinLnBrk="0" hangingPunct="1">
+              <a:lnSpc>
+                <a:spcPct val="90000"/>
+              </a:lnSpc>
+              <a:spcBef>
+                <a:spcPts val="500"/>
+              </a:spcBef>
+              <a:buFont typeface="Arial" panose="020B0604020202020204" pitchFamily="34" charset="0"/>
+              <a:buChar char="•"/>
+              <a:defRPr sz="1800" kern="1200">
+                <a:solidFill>
+                  <a:schemeClr val="tx1"/>
+                </a:solidFill>
+                <a:latin typeface="+mn-lt"/>
+                <a:ea typeface="+mn-ea"/>
+                <a:cs typeface="+mn-cs"/>
+              </a:defRPr>
+            </a:lvl7pPr>
+            <a:lvl8pPr marL="3429000" indent="-228600" algn="l" defTabSz="914400" rtl="0" eaLnBrk="1" latinLnBrk="0" hangingPunct="1">
+              <a:lnSpc>
+                <a:spcPct val="90000"/>
+              </a:lnSpc>
+              <a:spcBef>
+                <a:spcPts val="500"/>
+              </a:spcBef>
+              <a:buFont typeface="Arial" panose="020B0604020202020204" pitchFamily="34" charset="0"/>
+              <a:buChar char="•"/>
+              <a:defRPr sz="1800" kern="1200">
+                <a:solidFill>
+                  <a:schemeClr val="tx1"/>
+                </a:solidFill>
+                <a:latin typeface="+mn-lt"/>
+                <a:ea typeface="+mn-ea"/>
+                <a:cs typeface="+mn-cs"/>
+              </a:defRPr>
+            </a:lvl8pPr>
+            <a:lvl9pPr marL="3886200" indent="-228600" algn="l" defTabSz="914400" rtl="0" eaLnBrk="1" latinLnBrk="0" hangingPunct="1">
+              <a:lnSpc>
+                <a:spcPct val="90000"/>
+              </a:lnSpc>
+              <a:spcBef>
+                <a:spcPts val="500"/>
+              </a:spcBef>
+              <a:buFont typeface="Arial" panose="020B0604020202020204" pitchFamily="34" charset="0"/>
+              <a:buChar char="•"/>
+              <a:defRPr sz="1800" kern="1200">
+                <a:solidFill>
+                  <a:schemeClr val="tx1"/>
+                </a:solidFill>
+                <a:latin typeface="+mn-lt"/>
+                <a:ea typeface="+mn-ea"/>
+                <a:cs typeface="+mn-cs"/>
+              </a:defRPr>
+            </a:lvl9pPr>
+          </a:lstStyle>
+          <a:p>
+            <a:r>
+              <a:rPr lang="zh-CN" altLang="en-US" dirty="0"/>
+              <a:t>这是个编译中里很熟悉的 </a:t>
+            </a:r>
+            <a:r>
+              <a:rPr lang="en-US" altLang="zh-CN" dirty="0"/>
+              <a:t>switch...</a:t>
+            </a:r>
+            <a:r>
+              <a:rPr lang="zh-CN" altLang="en-US" dirty="0"/>
+              <a:t>优化。它不会用</a:t>
+            </a:r>
+            <a:r>
+              <a:rPr lang="en-US" altLang="zh-CN" dirty="0" err="1"/>
+              <a:t>auipc</a:t>
+            </a:r>
+            <a:r>
+              <a:rPr lang="zh-CN" altLang="en-US" dirty="0"/>
+              <a:t>直接跳转到各个</a:t>
+            </a:r>
+            <a:r>
+              <a:rPr lang="en-US" altLang="zh-CN" dirty="0"/>
+              <a:t>match</a:t>
+            </a:r>
+            <a:r>
+              <a:rPr lang="zh-CN" altLang="en-US" dirty="0"/>
+              <a:t>到的项，而是把 </a:t>
+            </a:r>
+            <a:r>
+              <a:rPr lang="en-US" altLang="zh-CN" dirty="0"/>
+              <a:t>match </a:t>
+            </a:r>
+            <a:r>
+              <a:rPr lang="zh-CN" altLang="en-US" dirty="0"/>
+              <a:t>的那个值取出来，然后把每个</a:t>
+            </a:r>
+            <a:r>
+              <a:rPr lang="en-US" altLang="zh-CN" dirty="0"/>
+              <a:t>match </a:t>
+            </a:r>
+            <a:r>
+              <a:rPr lang="zh-CN" altLang="en-US" dirty="0"/>
+              <a:t>到的值安排到偏移相同的几个地址，按图中的 </a:t>
+            </a:r>
+            <a:r>
+              <a:rPr lang="en-US" altLang="zh-CN" dirty="0" err="1"/>
+              <a:t>ld</a:t>
+            </a:r>
+            <a:r>
+              <a:rPr lang="en-US" altLang="zh-CN" dirty="0"/>
+              <a:t> a0, 0(a0) </a:t>
+            </a:r>
+            <a:r>
+              <a:rPr lang="zh-CN" altLang="en-US" dirty="0"/>
+              <a:t>拿到跳转地址，然后 </a:t>
+            </a:r>
+            <a:r>
+              <a:rPr lang="en-US" altLang="zh-CN" dirty="0" err="1"/>
+              <a:t>jr</a:t>
+            </a:r>
+            <a:r>
+              <a:rPr lang="en-US" altLang="zh-CN" dirty="0"/>
+              <a:t> a0 </a:t>
+            </a:r>
+            <a:r>
+              <a:rPr lang="zh-CN" altLang="en-US" dirty="0"/>
+              <a:t>完成跳转</a:t>
+            </a:r>
+            <a:endParaRPr lang="en-US" altLang="zh-CN" dirty="0"/>
+          </a:p>
+        </p:txBody>
+      </p:sp>
+    </p:spTree>
+    <p:extLst>
+      <p:ext uri="{BB962C8B-B14F-4D97-AF65-F5344CB8AC3E}">
+        <p14:creationId xmlns:p14="http://schemas.microsoft.com/office/powerpoint/2010/main" val="1326121998"/>
+      </p:ext>
+    </p:extLst>
+  </p:cSld>
+  <p:clrMapOvr>
+    <a:masterClrMapping/>
+  </p:clrMapOvr>
+</p:sld>
+</file>
+
+<file path=ppt/slides/slide8.xml><?xml version="1.0" encoding="utf-8"?>
+<p:sld xmlns:a="http://schemas.openxmlformats.org/drawingml/2006/main" xmlns:r="http://schemas.openxmlformats.org/officeDocument/2006/relationships" xmlns:p="http://schemas.openxmlformats.org/presentationml/2006/main">
+  <p:cSld>
+    <p:spTree>
+      <p:nvGrpSpPr>
+        <p:cNvPr id="1" name=""/>
+        <p:cNvGrpSpPr/>
+        <p:nvPr/>
+      </p:nvGrpSpPr>
+      <p:grpSpPr>
+        <a:xfrm>
+          <a:off x="0" y="0"/>
+          <a:ext cx="0" cy="0"/>
+          <a:chOff x="0" y="0"/>
+          <a:chExt cx="0" cy="0"/>
+        </a:xfrm>
+      </p:grpSpPr>
+      <p:sp>
+        <p:nvSpPr>
+          <p:cNvPr id="2" name="标题 1">
+            <a:extLst>
+              <a:ext uri="{FF2B5EF4-FFF2-40B4-BE49-F238E27FC236}">
+                <a16:creationId xmlns:a16="http://schemas.microsoft.com/office/drawing/2014/main" id="{B37E4971-D2EE-4D56-BF61-46705A60DC1F}"/>
+              </a:ext>
+            </a:extLst>
+          </p:cNvPr>
+          <p:cNvSpPr>
+            <a:spLocks noGrp="1"/>
+          </p:cNvSpPr>
+          <p:nvPr>
+            <p:ph type="title"/>
+          </p:nvPr>
+        </p:nvSpPr>
+        <p:spPr/>
+        <p:txBody>
+          <a:bodyPr/>
+          <a:lstStyle/>
+          <a:p>
+            <a:endParaRPr lang="zh-CN" altLang="en-US"/>
+          </a:p>
+        </p:txBody>
+      </p:sp>
+      <p:sp>
+        <p:nvSpPr>
+          <p:cNvPr id="3" name="内容占位符 2">
+            <a:extLst>
+              <a:ext uri="{FF2B5EF4-FFF2-40B4-BE49-F238E27FC236}">
+                <a16:creationId xmlns:a16="http://schemas.microsoft.com/office/drawing/2014/main" id="{FC986403-B863-4A78-A91F-01B4711728D4}"/>
+              </a:ext>
+            </a:extLst>
+          </p:cNvPr>
+          <p:cNvSpPr>
+            <a:spLocks noGrp="1"/>
+          </p:cNvSpPr>
+          <p:nvPr>
+            <p:ph idx="1"/>
+          </p:nvPr>
+        </p:nvSpPr>
+        <p:spPr/>
+        <p:txBody>
+          <a:bodyPr/>
+          <a:lstStyle/>
+          <a:p>
+            <a:r>
+              <a:rPr lang="en-US" altLang="zh-CN" dirty="0" err="1"/>
+              <a:t>ld</a:t>
+            </a:r>
+            <a:r>
+              <a:rPr lang="en-US" altLang="zh-CN" dirty="0"/>
+              <a:t> a0, 0(a0)</a:t>
+            </a:r>
+          </a:p>
+          <a:p>
+            <a:r>
+              <a:rPr lang="en-US" altLang="zh-CN" dirty="0"/>
+              <a:t> </a:t>
+            </a:r>
+            <a:r>
+              <a:rPr lang="en-US" altLang="zh-CN" dirty="0" err="1"/>
+              <a:t>jr</a:t>
+            </a:r>
+            <a:r>
+              <a:rPr lang="en-US" altLang="zh-CN" dirty="0"/>
+              <a:t> a0</a:t>
+            </a:r>
+          </a:p>
+          <a:p>
+            <a:r>
+              <a:rPr lang="zh-CN" altLang="en-US" dirty="0"/>
+              <a:t>这个指令序列使得“把内核偏移到和编译不同的地址运行”实际是不行的，或者至少是不稳定的</a:t>
+            </a:r>
+            <a:endParaRPr lang="en-US" altLang="zh-CN" dirty="0"/>
+          </a:p>
+          <a:p>
+            <a:r>
+              <a:rPr lang="en-US" altLang="zh-CN" dirty="0"/>
+              <a:t>-&gt; </a:t>
+            </a:r>
+            <a:r>
+              <a:rPr lang="zh-CN" altLang="en-US" dirty="0"/>
+              <a:t>彻底解决办法是 </a:t>
+            </a:r>
+            <a:r>
+              <a:rPr lang="en-US" altLang="zh-CN" dirty="0" err="1"/>
+              <a:t>base_address</a:t>
+            </a:r>
+            <a:r>
+              <a:rPr lang="en-US" altLang="zh-CN" dirty="0"/>
+              <a:t> = 0xffffffff80200000</a:t>
+            </a:r>
+            <a:endParaRPr lang="zh-CN" altLang="en-US" dirty="0"/>
+          </a:p>
+        </p:txBody>
+      </p:sp>
+    </p:spTree>
+    <p:extLst>
+      <p:ext uri="{BB962C8B-B14F-4D97-AF65-F5344CB8AC3E}">
+        <p14:creationId xmlns:p14="http://schemas.microsoft.com/office/powerpoint/2010/main" val="44474332"/>
+      </p:ext>
+    </p:extLst>
+  </p:cSld>
+  <p:clrMapOvr>
+    <a:masterClrMapping/>
+  </p:clrMapOvr>
+</p:sld>
+</file>
+
+<file path=ppt/slides/slide9.xml><?xml version="1.0" encoding="utf-8"?>
+<p:sld xmlns:a="http://schemas.openxmlformats.org/drawingml/2006/main" xmlns:r="http://schemas.openxmlformats.org/officeDocument/2006/relationships" xmlns:p="http://schemas.openxmlformats.org/presentationml/2006/main">
+  <p:cSld>
+    <p:spTree>
+      <p:nvGrpSpPr>
+        <p:cNvPr id="1" name=""/>
+        <p:cNvGrpSpPr/>
+        <p:nvPr/>
+      </p:nvGrpSpPr>
+      <p:grpSpPr>
+        <a:xfrm>
+          <a:off x="0" y="0"/>
+          <a:ext cx="0" cy="0"/>
+          <a:chOff x="0" y="0"/>
+          <a:chExt cx="0" cy="0"/>
+        </a:xfrm>
+      </p:grpSpPr>
+      <p:sp>
+        <p:nvSpPr>
+          <p:cNvPr id="2" name="标题 1">
+            <a:extLst>
+              <a:ext uri="{FF2B5EF4-FFF2-40B4-BE49-F238E27FC236}">
+                <a16:creationId xmlns:a16="http://schemas.microsoft.com/office/drawing/2014/main" id="{5623F452-E549-4478-AA5E-FFFF66FF2D98}"/>
+              </a:ext>
+            </a:extLst>
+          </p:cNvPr>
+          <p:cNvSpPr>
+            <a:spLocks noGrp="1"/>
+          </p:cNvSpPr>
+          <p:nvPr>
+            <p:ph type="title"/>
+          </p:nvPr>
+        </p:nvSpPr>
+        <p:spPr/>
+        <p:txBody>
+          <a:bodyPr/>
+          <a:lstStyle/>
+          <a:p>
+            <a:r>
+              <a:rPr lang="zh-CN" altLang="en-US" dirty="0"/>
+              <a:t>修改基地址</a:t>
+            </a:r>
+          </a:p>
+        </p:txBody>
+      </p:sp>
+      <p:sp>
+        <p:nvSpPr>
+          <p:cNvPr id="3" name="内容占位符 2">
+            <a:extLst>
+              <a:ext uri="{FF2B5EF4-FFF2-40B4-BE49-F238E27FC236}">
+                <a16:creationId xmlns:a16="http://schemas.microsoft.com/office/drawing/2014/main" id="{76C48034-47FD-4030-8C4F-9D37A55014D9}"/>
+              </a:ext>
+            </a:extLst>
+          </p:cNvPr>
+          <p:cNvSpPr>
+            <a:spLocks noGrp="1"/>
+          </p:cNvSpPr>
+          <p:nvPr>
+            <p:ph idx="1"/>
+          </p:nvPr>
+        </p:nvSpPr>
+        <p:spPr/>
+        <p:txBody>
+          <a:bodyPr/>
+          <a:lstStyle/>
+          <a:p>
+            <a:r>
+              <a:rPr lang="en-US" altLang="zh-CN" dirty="0" err="1"/>
+              <a:t>qemu</a:t>
+            </a:r>
+            <a:r>
+              <a:rPr lang="en-US" altLang="zh-CN" dirty="0"/>
+              <a:t> </a:t>
+            </a:r>
+            <a:r>
+              <a:rPr lang="zh-CN" altLang="en-US" dirty="0"/>
+              <a:t>里默认使用 </a:t>
+            </a:r>
+            <a:r>
+              <a:rPr lang="en-US" altLang="zh-CN" dirty="0" err="1"/>
+              <a:t>opensbi</a:t>
+            </a:r>
+            <a:r>
+              <a:rPr lang="zh-CN" altLang="en-US" dirty="0"/>
+              <a:t>，它把内核放到</a:t>
+            </a:r>
+            <a:r>
+              <a:rPr lang="en-US" altLang="zh-CN" dirty="0"/>
+              <a:t>0x80200000</a:t>
+            </a:r>
+            <a:r>
+              <a:rPr lang="zh-CN" altLang="en-US" dirty="0"/>
+              <a:t>，这个物理地址是 </a:t>
+            </a:r>
+            <a:r>
+              <a:rPr lang="en-US" altLang="zh-CN" dirty="0" err="1"/>
+              <a:t>sbi</a:t>
+            </a:r>
+            <a:r>
+              <a:rPr lang="en-US" altLang="zh-CN" dirty="0"/>
+              <a:t> </a:t>
+            </a:r>
+            <a:r>
+              <a:rPr lang="zh-CN" altLang="en-US" dirty="0"/>
+              <a:t>写死的，不能改，所以实际上内核有三个阶段的地址：</a:t>
+            </a:r>
+            <a:endParaRPr lang="en-US" altLang="zh-CN" dirty="0"/>
+          </a:p>
+          <a:p>
+            <a:r>
+              <a:rPr lang="zh-CN" altLang="en-US" dirty="0"/>
+              <a:t>编译时在高地址，反汇编可以看到标号都是</a:t>
+            </a:r>
+            <a:r>
+              <a:rPr lang="en-US" altLang="zh-CN" dirty="0" err="1"/>
+              <a:t>ffff</a:t>
+            </a:r>
+            <a:r>
+              <a:rPr lang="en-US" altLang="zh-CN" dirty="0"/>
+              <a:t>…</a:t>
+            </a:r>
+            <a:r>
+              <a:rPr lang="zh-CN" altLang="en-US" dirty="0"/>
+              <a:t>开头</a:t>
+            </a:r>
+            <a:endParaRPr lang="en-US" altLang="zh-CN" dirty="0"/>
+          </a:p>
+          <a:p>
+            <a:r>
+              <a:rPr lang="zh-CN" altLang="en-US" dirty="0"/>
+              <a:t>刚进内核时，被</a:t>
+            </a:r>
+            <a:r>
+              <a:rPr lang="en-US" altLang="zh-CN" dirty="0" err="1"/>
+              <a:t>sbi</a:t>
+            </a:r>
+            <a:r>
+              <a:rPr lang="zh-CN" altLang="en-US" dirty="0"/>
+              <a:t>放在低地址</a:t>
+            </a:r>
+            <a:endParaRPr lang="en-US" altLang="zh-CN" dirty="0"/>
+          </a:p>
+          <a:p>
+            <a:r>
+              <a:rPr lang="en-US" altLang="zh-CN" dirty="0" err="1"/>
+              <a:t>entry.S</a:t>
+            </a:r>
+            <a:r>
+              <a:rPr lang="zh-CN" altLang="en-US" dirty="0"/>
+              <a:t>中开启页表后，从高地址访问内核</a:t>
+            </a:r>
+            <a:endParaRPr lang="en-US" altLang="zh-CN" dirty="0"/>
+          </a:p>
+          <a:p>
+            <a:endParaRPr lang="en-US" altLang="zh-CN" dirty="0"/>
+          </a:p>
+          <a:p>
+            <a:r>
+              <a:rPr lang="zh-CN" altLang="en-US" dirty="0"/>
+              <a:t>这个过程中还需要改一些其他东西，是在张译仁学长指导下完成的</a:t>
+            </a:r>
+            <a:endParaRPr lang="en-US" altLang="zh-CN" dirty="0"/>
+          </a:p>
+        </p:txBody>
+      </p:sp>
+    </p:spTree>
+    <p:extLst>
+      <p:ext uri="{BB962C8B-B14F-4D97-AF65-F5344CB8AC3E}">
+        <p14:creationId xmlns:p14="http://schemas.microsoft.com/office/powerpoint/2010/main" val="3222171658"/>
       </p:ext>
     </p:extLst>
   </p:cSld>

</xml_diff>